<commit_message>
Updating the HGDP example
</commit_message>
<xml_diff>
--- a/FiguresWiki/Examples.pptx
+++ b/FiguresWiki/Examples.pptx
@@ -16,11 +16,16 @@
     <p:sldId id="264" r:id="rId10"/>
     <p:sldId id="265" r:id="rId11"/>
     <p:sldId id="266" r:id="rId12"/>
-    <p:sldId id="267" r:id="rId13"/>
-    <p:sldId id="268" r:id="rId14"/>
-    <p:sldId id="269" r:id="rId15"/>
-    <p:sldId id="270" r:id="rId16"/>
-    <p:sldId id="271" r:id="rId17"/>
+    <p:sldId id="276" r:id="rId13"/>
+    <p:sldId id="267" r:id="rId14"/>
+    <p:sldId id="268" r:id="rId15"/>
+    <p:sldId id="269" r:id="rId16"/>
+    <p:sldId id="274" r:id="rId17"/>
+    <p:sldId id="275" r:id="rId18"/>
+    <p:sldId id="270" r:id="rId19"/>
+    <p:sldId id="272" r:id="rId20"/>
+    <p:sldId id="273" r:id="rId21"/>
+    <p:sldId id="271" r:id="rId22"/>
   </p:sldIdLst>
   <p:sldSz cx="9144000" cy="6858000" type="screen4x3"/>
   <p:notesSz cx="6858000" cy="9144000"/>
@@ -319,7 +324,7 @@
           <a:p>
             <a:fld id="{4AF8D1E4-79D5-419A-84F5-5184F8D0060F}" type="datetimeFigureOut">
               <a:rPr lang="en-US" smtClean="0"/>
-              <a:t>11/4/2017</a:t>
+              <a:t>11/6/2017</a:t>
             </a:fld>
             <a:endParaRPr lang="en-US" dirty="0"/>
           </a:p>
@@ -489,7 +494,7 @@
           <a:p>
             <a:fld id="{4AF8D1E4-79D5-419A-84F5-5184F8D0060F}" type="datetimeFigureOut">
               <a:rPr lang="en-US" smtClean="0"/>
-              <a:t>11/4/2017</a:t>
+              <a:t>11/6/2017</a:t>
             </a:fld>
             <a:endParaRPr lang="en-US" dirty="0"/>
           </a:p>
@@ -669,7 +674,7 @@
           <a:p>
             <a:fld id="{4AF8D1E4-79D5-419A-84F5-5184F8D0060F}" type="datetimeFigureOut">
               <a:rPr lang="en-US" smtClean="0"/>
-              <a:t>11/4/2017</a:t>
+              <a:t>11/6/2017</a:t>
             </a:fld>
             <a:endParaRPr lang="en-US" dirty="0"/>
           </a:p>
@@ -839,7 +844,7 @@
           <a:p>
             <a:fld id="{4AF8D1E4-79D5-419A-84F5-5184F8D0060F}" type="datetimeFigureOut">
               <a:rPr lang="en-US" smtClean="0"/>
-              <a:t>11/4/2017</a:t>
+              <a:t>11/6/2017</a:t>
             </a:fld>
             <a:endParaRPr lang="en-US" dirty="0"/>
           </a:p>
@@ -1085,7 +1090,7 @@
           <a:p>
             <a:fld id="{4AF8D1E4-79D5-419A-84F5-5184F8D0060F}" type="datetimeFigureOut">
               <a:rPr lang="en-US" smtClean="0"/>
-              <a:t>11/4/2017</a:t>
+              <a:t>11/6/2017</a:t>
             </a:fld>
             <a:endParaRPr lang="en-US" dirty="0"/>
           </a:p>
@@ -1373,7 +1378,7 @@
           <a:p>
             <a:fld id="{4AF8D1E4-79D5-419A-84F5-5184F8D0060F}" type="datetimeFigureOut">
               <a:rPr lang="en-US" smtClean="0"/>
-              <a:t>11/4/2017</a:t>
+              <a:t>11/6/2017</a:t>
             </a:fld>
             <a:endParaRPr lang="en-US" dirty="0"/>
           </a:p>
@@ -1795,7 +1800,7 @@
           <a:p>
             <a:fld id="{4AF8D1E4-79D5-419A-84F5-5184F8D0060F}" type="datetimeFigureOut">
               <a:rPr lang="en-US" smtClean="0"/>
-              <a:t>11/4/2017</a:t>
+              <a:t>11/6/2017</a:t>
             </a:fld>
             <a:endParaRPr lang="en-US" dirty="0"/>
           </a:p>
@@ -1913,7 +1918,7 @@
           <a:p>
             <a:fld id="{4AF8D1E4-79D5-419A-84F5-5184F8D0060F}" type="datetimeFigureOut">
               <a:rPr lang="en-US" smtClean="0"/>
-              <a:t>11/4/2017</a:t>
+              <a:t>11/6/2017</a:t>
             </a:fld>
             <a:endParaRPr lang="en-US" dirty="0"/>
           </a:p>
@@ -2008,7 +2013,7 @@
           <a:p>
             <a:fld id="{4AF8D1E4-79D5-419A-84F5-5184F8D0060F}" type="datetimeFigureOut">
               <a:rPr lang="en-US" smtClean="0"/>
-              <a:t>11/4/2017</a:t>
+              <a:t>11/6/2017</a:t>
             </a:fld>
             <a:endParaRPr lang="en-US" dirty="0"/>
           </a:p>
@@ -2285,7 +2290,7 @@
           <a:p>
             <a:fld id="{4AF8D1E4-79D5-419A-84F5-5184F8D0060F}" type="datetimeFigureOut">
               <a:rPr lang="en-US" smtClean="0"/>
-              <a:t>11/4/2017</a:t>
+              <a:t>11/6/2017</a:t>
             </a:fld>
             <a:endParaRPr lang="en-US" dirty="0"/>
           </a:p>
@@ -2538,7 +2543,7 @@
           <a:p>
             <a:fld id="{4AF8D1E4-79D5-419A-84F5-5184F8D0060F}" type="datetimeFigureOut">
               <a:rPr lang="en-US" smtClean="0"/>
-              <a:t>11/4/2017</a:t>
+              <a:t>11/6/2017</a:t>
             </a:fld>
             <a:endParaRPr lang="en-US" dirty="0"/>
           </a:p>
@@ -2751,7 +2756,7 @@
           <a:p>
             <a:fld id="{4AF8D1E4-79D5-419A-84F5-5184F8D0060F}" type="datetimeFigureOut">
               <a:rPr lang="en-US" smtClean="0"/>
-              <a:t>11/4/2017</a:t>
+              <a:t>11/6/2017</a:t>
             </a:fld>
             <a:endParaRPr lang="en-US" dirty="0"/>
           </a:p>
@@ -3971,6 +3976,143 @@
       </p:grpSpPr>
       <p:pic>
         <p:nvPicPr>
+          <p:cNvPr id="4" name="Image 3"/>
+          <p:cNvPicPr>
+            <a:picLocks noChangeAspect="1"/>
+          </p:cNvPicPr>
+          <p:nvPr/>
+        </p:nvPicPr>
+        <p:blipFill rotWithShape="1">
+          <a:blip r:embed="rId2"/>
+          <a:srcRect b="1360"/>
+          <a:stretch/>
+        </p:blipFill>
+        <p:spPr>
+          <a:xfrm>
+            <a:off x="152401" y="838200"/>
+            <a:ext cx="4724400" cy="4108030"/>
+          </a:xfrm>
+          <a:prstGeom prst="rect">
+            <a:avLst/>
+          </a:prstGeom>
+        </p:spPr>
+      </p:pic>
+      <p:sp>
+        <p:nvSpPr>
+          <p:cNvPr id="5" name="Rectangle 4"/>
+          <p:cNvSpPr/>
+          <p:nvPr/>
+        </p:nvSpPr>
+        <p:spPr>
+          <a:xfrm>
+            <a:off x="1752600" y="3124200"/>
+            <a:ext cx="1143000" cy="1066800"/>
+          </a:xfrm>
+          <a:prstGeom prst="rect">
+            <a:avLst/>
+          </a:prstGeom>
+          <a:noFill/>
+          <a:ln>
+            <a:solidFill>
+              <a:schemeClr val="tx1"/>
+            </a:solidFill>
+            <a:prstDash val="dash"/>
+          </a:ln>
+        </p:spPr>
+        <p:style>
+          <a:lnRef idx="2">
+            <a:schemeClr val="accent1">
+              <a:shade val="50000"/>
+            </a:schemeClr>
+          </a:lnRef>
+          <a:fillRef idx="1">
+            <a:schemeClr val="accent1"/>
+          </a:fillRef>
+          <a:effectRef idx="0">
+            <a:schemeClr val="accent1"/>
+          </a:effectRef>
+          <a:fontRef idx="minor">
+            <a:schemeClr val="lt1"/>
+          </a:fontRef>
+        </p:style>
+        <p:txBody>
+          <a:bodyPr rtlCol="0" anchor="ctr"/>
+          <a:lstStyle/>
+          <a:p>
+            <a:pPr algn="ctr"/>
+            <a:endParaRPr lang="en-US"/>
+          </a:p>
+        </p:txBody>
+      </p:sp>
+      <p:pic>
+        <p:nvPicPr>
+          <p:cNvPr id="6" name="Image 5"/>
+          <p:cNvPicPr>
+            <a:picLocks noChangeAspect="1"/>
+          </p:cNvPicPr>
+          <p:nvPr/>
+        </p:nvPicPr>
+        <p:blipFill>
+          <a:blip r:embed="rId3"/>
+          <a:stretch>
+            <a:fillRect/>
+          </a:stretch>
+        </p:blipFill>
+        <p:spPr>
+          <a:xfrm>
+            <a:off x="5181600" y="1725402"/>
+            <a:ext cx="3339924" cy="2333625"/>
+          </a:xfrm>
+          <a:prstGeom prst="rect">
+            <a:avLst/>
+          </a:prstGeom>
+          <a:ln w="38100">
+            <a:solidFill>
+              <a:schemeClr val="tx1"/>
+            </a:solidFill>
+            <a:prstDash val="dash"/>
+          </a:ln>
+        </p:spPr>
+      </p:pic>
+    </p:spTree>
+    <p:extLst>
+      <p:ext uri="{BB962C8B-B14F-4D97-AF65-F5344CB8AC3E}">
+        <p14:creationId xmlns:p14="http://schemas.microsoft.com/office/powerpoint/2010/main" val="291644856"/>
+      </p:ext>
+    </p:extLst>
+  </p:cSld>
+  <p:clrMapOvr>
+    <a:masterClrMapping/>
+  </p:clrMapOvr>
+  <p:timing>
+    <p:tnLst>
+      <p:par>
+        <p:cTn id="1" dur="indefinite" restart="never" nodeType="tmRoot"/>
+      </p:par>
+    </p:tnLst>
+  </p:timing>
+</p:sld>
+</file>
+
+<file path=ppt/slides/slide13.xml><?xml version="1.0" encoding="utf-8"?>
+<p:sld xmlns:a="http://schemas.openxmlformats.org/drawingml/2006/main" xmlns:r="http://schemas.openxmlformats.org/officeDocument/2006/relationships" xmlns:p="http://schemas.openxmlformats.org/presentationml/2006/main">
+  <p:cSld>
+    <p:spTree>
+      <p:nvGrpSpPr>
+        <p:cNvPr id="1" name=""/>
+        <p:cNvGrpSpPr/>
+        <p:nvPr/>
+      </p:nvGrpSpPr>
+      <p:grpSpPr>
+        <a:xfrm>
+          <a:off x="0" y="0"/>
+          <a:ext cx="0" cy="0"/>
+          <a:chOff x="0" y="0"/>
+          <a:chExt cx="0" cy="0"/>
+        </a:xfrm>
+      </p:grpSpPr>
+      <p:pic>
+        <p:nvPicPr>
           <p:cNvPr id="6146" name="Picture 2"/>
           <p:cNvPicPr>
             <a:picLocks noChangeAspect="1" noChangeArrowheads="1"/>
@@ -4053,7 +4195,7 @@
 </p:sld>
 </file>
 
-<file path=ppt/slides/slide13.xml><?xml version="1.0" encoding="utf-8"?>
+<file path=ppt/slides/slide14.xml><?xml version="1.0" encoding="utf-8"?>
 <p:sld xmlns:a="http://schemas.openxmlformats.org/drawingml/2006/main" xmlns:r="http://schemas.openxmlformats.org/officeDocument/2006/relationships" xmlns:p="http://schemas.openxmlformats.org/presentationml/2006/main">
   <p:cSld>
     <p:spTree>
@@ -4265,7 +4407,7 @@
 </p:sld>
 </file>
 
-<file path=ppt/slides/slide14.xml><?xml version="1.0" encoding="utf-8"?>
+<file path=ppt/slides/slide15.xml><?xml version="1.0" encoding="utf-8"?>
 <p:sld xmlns:a="http://schemas.openxmlformats.org/drawingml/2006/main" xmlns:r="http://schemas.openxmlformats.org/officeDocument/2006/relationships" xmlns:p="http://schemas.openxmlformats.org/presentationml/2006/main">
   <p:cSld>
     <p:spTree>
@@ -4414,213 +4556,6 @@
     <p:extLst>
       <p:ext uri="{BB962C8B-B14F-4D97-AF65-F5344CB8AC3E}">
         <p14:creationId xmlns:p14="http://schemas.microsoft.com/office/powerpoint/2010/main" val="3718445551"/>
-      </p:ext>
-    </p:extLst>
-  </p:cSld>
-  <p:clrMapOvr>
-    <a:masterClrMapping/>
-  </p:clrMapOvr>
-  <p:timing>
-    <p:tnLst>
-      <p:par>
-        <p:cTn id="1" dur="indefinite" restart="never" nodeType="tmRoot"/>
-      </p:par>
-    </p:tnLst>
-  </p:timing>
-</p:sld>
-</file>
-
-<file path=ppt/slides/slide15.xml><?xml version="1.0" encoding="utf-8"?>
-<p:sld xmlns:a="http://schemas.openxmlformats.org/drawingml/2006/main" xmlns:r="http://schemas.openxmlformats.org/officeDocument/2006/relationships" xmlns:p="http://schemas.openxmlformats.org/presentationml/2006/main">
-  <p:cSld>
-    <p:spTree>
-      <p:nvGrpSpPr>
-        <p:cNvPr id="1" name=""/>
-        <p:cNvGrpSpPr/>
-        <p:nvPr/>
-      </p:nvGrpSpPr>
-      <p:grpSpPr>
-        <a:xfrm>
-          <a:off x="0" y="0"/>
-          <a:ext cx="0" cy="0"/>
-          <a:chOff x="0" y="0"/>
-          <a:chExt cx="0" cy="0"/>
-        </a:xfrm>
-      </p:grpSpPr>
-      <p:pic>
-        <p:nvPicPr>
-          <p:cNvPr id="9218" name="Picture 2"/>
-          <p:cNvPicPr>
-            <a:picLocks noChangeAspect="1" noChangeArrowheads="1"/>
-          </p:cNvPicPr>
-          <p:nvPr/>
-        </p:nvPicPr>
-        <p:blipFill>
-          <a:blip r:embed="rId2">
-            <a:extLst>
-              <a:ext uri="{28A0092B-C50C-407E-A947-70E740481C1C}">
-                <a14:useLocalDpi xmlns:a14="http://schemas.microsoft.com/office/drawing/2010/main" val="0"/>
-              </a:ext>
-            </a:extLst>
-          </a:blip>
-          <a:srcRect/>
-          <a:stretch>
-            <a:fillRect/>
-          </a:stretch>
-        </p:blipFill>
-        <p:spPr bwMode="auto">
-          <a:xfrm>
-            <a:off x="4724400" y="1600200"/>
-            <a:ext cx="3902534" cy="3168650"/>
-          </a:xfrm>
-          <a:prstGeom prst="rect">
-            <a:avLst/>
-          </a:prstGeom>
-          <a:noFill/>
-          <a:ln w="9525">
-            <a:solidFill>
-              <a:schemeClr val="tx1"/>
-            </a:solidFill>
-            <a:miter lim="800000"/>
-            <a:headEnd/>
-            <a:tailEnd/>
-          </a:ln>
-          <a:effectLst/>
-          <a:extLst>
-            <a:ext uri="{909E8E84-426E-40DD-AFC4-6F175D3DCCD1}">
-              <a14:hiddenFill xmlns:a14="http://schemas.microsoft.com/office/drawing/2010/main">
-                <a:solidFill>
-                  <a:schemeClr val="accent1"/>
-                </a:solidFill>
-              </a14:hiddenFill>
-            </a:ext>
-            <a:ext uri="{AF507438-7753-43E0-B8FC-AC1667EBCBE1}">
-              <a14:hiddenEffects xmlns:a14="http://schemas.microsoft.com/office/drawing/2010/main">
-                <a:effectLst>
-                  <a:outerShdw dist="35921" dir="2700000" algn="ctr" rotWithShape="0">
-                    <a:schemeClr val="bg2"/>
-                  </a:outerShdw>
-                </a:effectLst>
-              </a14:hiddenEffects>
-            </a:ext>
-          </a:extLst>
-        </p:spPr>
-      </p:pic>
-      <p:pic>
-        <p:nvPicPr>
-          <p:cNvPr id="9219" name="Picture 3"/>
-          <p:cNvPicPr>
-            <a:picLocks noChangeAspect="1" noChangeArrowheads="1"/>
-          </p:cNvPicPr>
-          <p:nvPr/>
-        </p:nvPicPr>
-        <p:blipFill>
-          <a:blip r:embed="rId3">
-            <a:extLst>
-              <a:ext uri="{28A0092B-C50C-407E-A947-70E740481C1C}">
-                <a14:useLocalDpi xmlns:a14="http://schemas.microsoft.com/office/drawing/2010/main" val="0"/>
-              </a:ext>
-            </a:extLst>
-          </a:blip>
-          <a:srcRect/>
-          <a:stretch>
-            <a:fillRect/>
-          </a:stretch>
-        </p:blipFill>
-        <p:spPr bwMode="auto">
-          <a:xfrm>
-            <a:off x="304800" y="1600200"/>
-            <a:ext cx="4125286" cy="3286125"/>
-          </a:xfrm>
-          <a:prstGeom prst="rect">
-            <a:avLst/>
-          </a:prstGeom>
-          <a:noFill/>
-          <a:ln>
-            <a:noFill/>
-          </a:ln>
-          <a:effectLst/>
-          <a:extLst>
-            <a:ext uri="{909E8E84-426E-40DD-AFC4-6F175D3DCCD1}">
-              <a14:hiddenFill xmlns:a14="http://schemas.microsoft.com/office/drawing/2010/main">
-                <a:solidFill>
-                  <a:schemeClr val="accent1"/>
-                </a:solidFill>
-              </a14:hiddenFill>
-            </a:ext>
-            <a:ext uri="{91240B29-F687-4F45-9708-019B960494DF}">
-              <a14:hiddenLine xmlns:a14="http://schemas.microsoft.com/office/drawing/2010/main" w="9525">
-                <a:solidFill>
-                  <a:schemeClr val="tx1"/>
-                </a:solidFill>
-                <a:miter lim="800000"/>
-                <a:headEnd/>
-                <a:tailEnd/>
-              </a14:hiddenLine>
-            </a:ext>
-            <a:ext uri="{AF507438-7753-43E0-B8FC-AC1667EBCBE1}">
-              <a14:hiddenEffects xmlns:a14="http://schemas.microsoft.com/office/drawing/2010/main">
-                <a:effectLst>
-                  <a:outerShdw dist="35921" dir="2700000" algn="ctr" rotWithShape="0">
-                    <a:schemeClr val="bg2"/>
-                  </a:outerShdw>
-                </a:effectLst>
-              </a14:hiddenEffects>
-            </a:ext>
-          </a:extLst>
-        </p:spPr>
-      </p:pic>
-      <p:sp>
-        <p:nvSpPr>
-          <p:cNvPr id="6" name="Rectangle 5"/>
-          <p:cNvSpPr/>
-          <p:nvPr/>
-        </p:nvSpPr>
-        <p:spPr>
-          <a:xfrm>
-            <a:off x="1447800" y="3505200"/>
-            <a:ext cx="1143000" cy="1066800"/>
-          </a:xfrm>
-          <a:prstGeom prst="rect">
-            <a:avLst/>
-          </a:prstGeom>
-          <a:noFill/>
-          <a:ln>
-            <a:solidFill>
-              <a:schemeClr val="tx1"/>
-            </a:solidFill>
-            <a:prstDash val="dash"/>
-          </a:ln>
-        </p:spPr>
-        <p:style>
-          <a:lnRef idx="2">
-            <a:schemeClr val="accent1">
-              <a:shade val="50000"/>
-            </a:schemeClr>
-          </a:lnRef>
-          <a:fillRef idx="1">
-            <a:schemeClr val="accent1"/>
-          </a:fillRef>
-          <a:effectRef idx="0">
-            <a:schemeClr val="accent1"/>
-          </a:effectRef>
-          <a:fontRef idx="minor">
-            <a:schemeClr val="lt1"/>
-          </a:fontRef>
-        </p:style>
-        <p:txBody>
-          <a:bodyPr rtlCol="0" anchor="ctr"/>
-          <a:lstStyle/>
-          <a:p>
-            <a:pPr algn="ctr"/>
-            <a:endParaRPr lang="en-US"/>
-          </a:p>
-        </p:txBody>
-      </p:sp>
-    </p:spTree>
-    <p:extLst>
-      <p:ext uri="{BB962C8B-B14F-4D97-AF65-F5344CB8AC3E}">
-        <p14:creationId xmlns:p14="http://schemas.microsoft.com/office/powerpoint/2010/main" val="1337374101"/>
       </p:ext>
     </p:extLst>
   </p:cSld>
@@ -4670,17 +4605,64 @@
         </p:blipFill>
         <p:spPr>
           <a:xfrm>
-            <a:off x="441052" y="324464"/>
-            <a:ext cx="3550844" cy="2895600"/>
+            <a:off x="152401" y="762000"/>
+            <a:ext cx="4267200" cy="3417160"/>
           </a:xfrm>
           <a:prstGeom prst="rect">
             <a:avLst/>
           </a:prstGeom>
         </p:spPr>
       </p:pic>
+      <p:sp>
+        <p:nvSpPr>
+          <p:cNvPr id="6" name="Rectangle 5"/>
+          <p:cNvSpPr/>
+          <p:nvPr/>
+        </p:nvSpPr>
+        <p:spPr>
+          <a:xfrm>
+            <a:off x="1600200" y="2209800"/>
+            <a:ext cx="914400" cy="762000"/>
+          </a:xfrm>
+          <a:prstGeom prst="rect">
+            <a:avLst/>
+          </a:prstGeom>
+          <a:noFill/>
+          <a:ln>
+            <a:solidFill>
+              <a:schemeClr val="tx1"/>
+            </a:solidFill>
+            <a:prstDash val="dash"/>
+          </a:ln>
+        </p:spPr>
+        <p:style>
+          <a:lnRef idx="2">
+            <a:schemeClr val="accent1">
+              <a:shade val="50000"/>
+            </a:schemeClr>
+          </a:lnRef>
+          <a:fillRef idx="1">
+            <a:schemeClr val="accent1"/>
+          </a:fillRef>
+          <a:effectRef idx="0">
+            <a:schemeClr val="accent1"/>
+          </a:effectRef>
+          <a:fontRef idx="minor">
+            <a:schemeClr val="lt1"/>
+          </a:fontRef>
+        </p:style>
+        <p:txBody>
+          <a:bodyPr rtlCol="0" anchor="ctr"/>
+          <a:lstStyle/>
+          <a:p>
+            <a:pPr algn="ctr"/>
+            <a:endParaRPr lang="en-GB"/>
+          </a:p>
+        </p:txBody>
+      </p:sp>
       <p:pic>
         <p:nvPicPr>
-          <p:cNvPr id="3" name="Image 2"/>
+          <p:cNvPr id="7" name="Image 6"/>
           <p:cNvPicPr>
             <a:picLocks noChangeAspect="1"/>
           </p:cNvPicPr>
@@ -4694,17 +4676,672 @@
         </p:blipFill>
         <p:spPr>
           <a:xfrm>
-            <a:off x="3896032" y="324464"/>
-            <a:ext cx="3577576" cy="2848898"/>
-          </a:xfrm>
-          <a:prstGeom prst="rect">
-            <a:avLst/>
-          </a:prstGeom>
+            <a:off x="4648200" y="1220069"/>
+            <a:ext cx="2843213" cy="2501021"/>
+          </a:xfrm>
+          <a:prstGeom prst="rect">
+            <a:avLst/>
+          </a:prstGeom>
+          <a:ln w="63500">
+            <a:solidFill>
+              <a:schemeClr val="tx1"/>
+            </a:solidFill>
+            <a:prstDash val="dash"/>
+          </a:ln>
+        </p:spPr>
+      </p:pic>
+    </p:spTree>
+    <p:extLst>
+      <p:ext uri="{BB962C8B-B14F-4D97-AF65-F5344CB8AC3E}">
+        <p14:creationId xmlns:p14="http://schemas.microsoft.com/office/powerpoint/2010/main" val="548944189"/>
+      </p:ext>
+    </p:extLst>
+  </p:cSld>
+  <p:clrMapOvr>
+    <a:masterClrMapping/>
+  </p:clrMapOvr>
+  <p:timing>
+    <p:tnLst>
+      <p:par>
+        <p:cTn id="1" dur="indefinite" restart="never" nodeType="tmRoot"/>
+      </p:par>
+    </p:tnLst>
+  </p:timing>
+</p:sld>
+</file>
+
+<file path=ppt/slides/slide17.xml><?xml version="1.0" encoding="utf-8"?>
+<p:sld xmlns:a="http://schemas.openxmlformats.org/drawingml/2006/main" xmlns:r="http://schemas.openxmlformats.org/officeDocument/2006/relationships" xmlns:p="http://schemas.openxmlformats.org/presentationml/2006/main">
+  <p:cSld>
+    <p:spTree>
+      <p:nvGrpSpPr>
+        <p:cNvPr id="1" name=""/>
+        <p:cNvGrpSpPr/>
+        <p:nvPr/>
+      </p:nvGrpSpPr>
+      <p:grpSpPr>
+        <a:xfrm>
+          <a:off x="0" y="0"/>
+          <a:ext cx="0" cy="0"/>
+          <a:chOff x="0" y="0"/>
+          <a:chExt cx="0" cy="0"/>
+        </a:xfrm>
+      </p:grpSpPr>
+      <p:pic>
+        <p:nvPicPr>
+          <p:cNvPr id="3" name="Image 2"/>
+          <p:cNvPicPr>
+            <a:picLocks noChangeAspect="1"/>
+          </p:cNvPicPr>
+          <p:nvPr/>
+        </p:nvPicPr>
+        <p:blipFill>
+          <a:blip r:embed="rId2"/>
+          <a:stretch>
+            <a:fillRect/>
+          </a:stretch>
+        </p:blipFill>
+        <p:spPr>
+          <a:xfrm>
+            <a:off x="228600" y="762000"/>
+            <a:ext cx="4186434" cy="3429000"/>
+          </a:xfrm>
+          <a:prstGeom prst="rect">
+            <a:avLst/>
+          </a:prstGeom>
+        </p:spPr>
+      </p:pic>
+      <p:sp>
+        <p:nvSpPr>
+          <p:cNvPr id="6" name="Rectangle 5"/>
+          <p:cNvSpPr/>
+          <p:nvPr/>
+        </p:nvSpPr>
+        <p:spPr>
+          <a:xfrm>
+            <a:off x="1447800" y="2875936"/>
+            <a:ext cx="1066800" cy="990600"/>
+          </a:xfrm>
+          <a:prstGeom prst="rect">
+            <a:avLst/>
+          </a:prstGeom>
+          <a:noFill/>
+          <a:ln>
+            <a:solidFill>
+              <a:schemeClr val="tx1"/>
+            </a:solidFill>
+            <a:prstDash val="dash"/>
+          </a:ln>
+        </p:spPr>
+        <p:style>
+          <a:lnRef idx="2">
+            <a:schemeClr val="accent1">
+              <a:shade val="50000"/>
+            </a:schemeClr>
+          </a:lnRef>
+          <a:fillRef idx="1">
+            <a:schemeClr val="accent1"/>
+          </a:fillRef>
+          <a:effectRef idx="0">
+            <a:schemeClr val="accent1"/>
+          </a:effectRef>
+          <a:fontRef idx="minor">
+            <a:schemeClr val="lt1"/>
+          </a:fontRef>
+        </p:style>
+        <p:txBody>
+          <a:bodyPr rtlCol="0" anchor="ctr"/>
+          <a:lstStyle/>
+          <a:p>
+            <a:pPr algn="ctr"/>
+            <a:endParaRPr lang="en-GB"/>
+          </a:p>
+        </p:txBody>
+      </p:sp>
+      <p:pic>
+        <p:nvPicPr>
+          <p:cNvPr id="2" name="Image 1"/>
+          <p:cNvPicPr>
+            <a:picLocks noChangeAspect="1"/>
+          </p:cNvPicPr>
+          <p:nvPr/>
+        </p:nvPicPr>
+        <p:blipFill rotWithShape="1">
+          <a:blip r:embed="rId3"/>
+          <a:srcRect t="2191"/>
+          <a:stretch/>
+        </p:blipFill>
+        <p:spPr>
+          <a:xfrm>
+            <a:off x="4572000" y="838200"/>
+            <a:ext cx="4184172" cy="3276600"/>
+          </a:xfrm>
+          <a:prstGeom prst="rect">
+            <a:avLst/>
+          </a:prstGeom>
+          <a:ln w="38100">
+            <a:solidFill>
+              <a:schemeClr val="tx1"/>
+            </a:solidFill>
+            <a:prstDash val="dash"/>
+          </a:ln>
+        </p:spPr>
+      </p:pic>
+    </p:spTree>
+    <p:extLst>
+      <p:ext uri="{BB962C8B-B14F-4D97-AF65-F5344CB8AC3E}">
+        <p14:creationId xmlns:p14="http://schemas.microsoft.com/office/powerpoint/2010/main" val="45345204"/>
+      </p:ext>
+    </p:extLst>
+  </p:cSld>
+  <p:clrMapOvr>
+    <a:masterClrMapping/>
+  </p:clrMapOvr>
+  <p:timing>
+    <p:tnLst>
+      <p:par>
+        <p:cTn id="1" dur="indefinite" restart="never" nodeType="tmRoot"/>
+      </p:par>
+    </p:tnLst>
+  </p:timing>
+</p:sld>
+</file>
+
+<file path=ppt/slides/slide18.xml><?xml version="1.0" encoding="utf-8"?>
+<p:sld xmlns:a="http://schemas.openxmlformats.org/drawingml/2006/main" xmlns:r="http://schemas.openxmlformats.org/officeDocument/2006/relationships" xmlns:p="http://schemas.openxmlformats.org/presentationml/2006/main">
+  <p:cSld>
+    <p:spTree>
+      <p:nvGrpSpPr>
+        <p:cNvPr id="1" name=""/>
+        <p:cNvGrpSpPr/>
+        <p:nvPr/>
+      </p:nvGrpSpPr>
+      <p:grpSpPr>
+        <a:xfrm>
+          <a:off x="0" y="0"/>
+          <a:ext cx="0" cy="0"/>
+          <a:chOff x="0" y="0"/>
+          <a:chExt cx="0" cy="0"/>
+        </a:xfrm>
+      </p:grpSpPr>
+      <p:pic>
+        <p:nvPicPr>
+          <p:cNvPr id="9218" name="Picture 2"/>
+          <p:cNvPicPr>
+            <a:picLocks noChangeAspect="1" noChangeArrowheads="1"/>
+          </p:cNvPicPr>
+          <p:nvPr/>
+        </p:nvPicPr>
+        <p:blipFill>
+          <a:blip r:embed="rId2">
+            <a:extLst>
+              <a:ext uri="{28A0092B-C50C-407E-A947-70E740481C1C}">
+                <a14:useLocalDpi xmlns:a14="http://schemas.microsoft.com/office/drawing/2010/main" val="0"/>
+              </a:ext>
+            </a:extLst>
+          </a:blip>
+          <a:srcRect/>
+          <a:stretch>
+            <a:fillRect/>
+          </a:stretch>
+        </p:blipFill>
+        <p:spPr bwMode="auto">
+          <a:xfrm>
+            <a:off x="4724400" y="1600200"/>
+            <a:ext cx="3902534" cy="3168650"/>
+          </a:xfrm>
+          <a:prstGeom prst="rect">
+            <a:avLst/>
+          </a:prstGeom>
+          <a:noFill/>
+          <a:ln w="9525">
+            <a:solidFill>
+              <a:schemeClr val="tx1"/>
+            </a:solidFill>
+            <a:miter lim="800000"/>
+            <a:headEnd/>
+            <a:tailEnd/>
+          </a:ln>
+          <a:effectLst/>
+          <a:extLst>
+            <a:ext uri="{909E8E84-426E-40DD-AFC4-6F175D3DCCD1}">
+              <a14:hiddenFill xmlns:a14="http://schemas.microsoft.com/office/drawing/2010/main">
+                <a:solidFill>
+                  <a:schemeClr val="accent1"/>
+                </a:solidFill>
+              </a14:hiddenFill>
+            </a:ext>
+            <a:ext uri="{AF507438-7753-43E0-B8FC-AC1667EBCBE1}">
+              <a14:hiddenEffects xmlns:a14="http://schemas.microsoft.com/office/drawing/2010/main">
+                <a:effectLst>
+                  <a:outerShdw dist="35921" dir="2700000" algn="ctr" rotWithShape="0">
+                    <a:schemeClr val="bg2"/>
+                  </a:outerShdw>
+                </a:effectLst>
+              </a14:hiddenEffects>
+            </a:ext>
+          </a:extLst>
         </p:spPr>
       </p:pic>
       <p:pic>
         <p:nvPicPr>
-          <p:cNvPr id="4" name="Image 3"/>
+          <p:cNvPr id="9219" name="Picture 3"/>
+          <p:cNvPicPr>
+            <a:picLocks noChangeAspect="1" noChangeArrowheads="1"/>
+          </p:cNvPicPr>
+          <p:nvPr/>
+        </p:nvPicPr>
+        <p:blipFill>
+          <a:blip r:embed="rId3">
+            <a:extLst>
+              <a:ext uri="{28A0092B-C50C-407E-A947-70E740481C1C}">
+                <a14:useLocalDpi xmlns:a14="http://schemas.microsoft.com/office/drawing/2010/main" val="0"/>
+              </a:ext>
+            </a:extLst>
+          </a:blip>
+          <a:srcRect/>
+          <a:stretch>
+            <a:fillRect/>
+          </a:stretch>
+        </p:blipFill>
+        <p:spPr bwMode="auto">
+          <a:xfrm>
+            <a:off x="304800" y="1600200"/>
+            <a:ext cx="4125286" cy="3286125"/>
+          </a:xfrm>
+          <a:prstGeom prst="rect">
+            <a:avLst/>
+          </a:prstGeom>
+          <a:noFill/>
+          <a:ln>
+            <a:noFill/>
+          </a:ln>
+          <a:effectLst/>
+          <a:extLst>
+            <a:ext uri="{909E8E84-426E-40DD-AFC4-6F175D3DCCD1}">
+              <a14:hiddenFill xmlns:a14="http://schemas.microsoft.com/office/drawing/2010/main">
+                <a:solidFill>
+                  <a:schemeClr val="accent1"/>
+                </a:solidFill>
+              </a14:hiddenFill>
+            </a:ext>
+            <a:ext uri="{91240B29-F687-4F45-9708-019B960494DF}">
+              <a14:hiddenLine xmlns:a14="http://schemas.microsoft.com/office/drawing/2010/main" w="9525">
+                <a:solidFill>
+                  <a:schemeClr val="tx1"/>
+                </a:solidFill>
+                <a:miter lim="800000"/>
+                <a:headEnd/>
+                <a:tailEnd/>
+              </a14:hiddenLine>
+            </a:ext>
+            <a:ext uri="{AF507438-7753-43E0-B8FC-AC1667EBCBE1}">
+              <a14:hiddenEffects xmlns:a14="http://schemas.microsoft.com/office/drawing/2010/main">
+                <a:effectLst>
+                  <a:outerShdw dist="35921" dir="2700000" algn="ctr" rotWithShape="0">
+                    <a:schemeClr val="bg2"/>
+                  </a:outerShdw>
+                </a:effectLst>
+              </a14:hiddenEffects>
+            </a:ext>
+          </a:extLst>
+        </p:spPr>
+      </p:pic>
+      <p:sp>
+        <p:nvSpPr>
+          <p:cNvPr id="6" name="Rectangle 5"/>
+          <p:cNvSpPr/>
+          <p:nvPr/>
+        </p:nvSpPr>
+        <p:spPr>
+          <a:xfrm>
+            <a:off x="1447800" y="3505200"/>
+            <a:ext cx="1143000" cy="1066800"/>
+          </a:xfrm>
+          <a:prstGeom prst="rect">
+            <a:avLst/>
+          </a:prstGeom>
+          <a:noFill/>
+          <a:ln>
+            <a:solidFill>
+              <a:schemeClr val="tx1"/>
+            </a:solidFill>
+            <a:prstDash val="dash"/>
+          </a:ln>
+        </p:spPr>
+        <p:style>
+          <a:lnRef idx="2">
+            <a:schemeClr val="accent1">
+              <a:shade val="50000"/>
+            </a:schemeClr>
+          </a:lnRef>
+          <a:fillRef idx="1">
+            <a:schemeClr val="accent1"/>
+          </a:fillRef>
+          <a:effectRef idx="0">
+            <a:schemeClr val="accent1"/>
+          </a:effectRef>
+          <a:fontRef idx="minor">
+            <a:schemeClr val="lt1"/>
+          </a:fontRef>
+        </p:style>
+        <p:txBody>
+          <a:bodyPr rtlCol="0" anchor="ctr"/>
+          <a:lstStyle/>
+          <a:p>
+            <a:pPr algn="ctr"/>
+            <a:endParaRPr lang="en-US"/>
+          </a:p>
+        </p:txBody>
+      </p:sp>
+    </p:spTree>
+    <p:extLst>
+      <p:ext uri="{BB962C8B-B14F-4D97-AF65-F5344CB8AC3E}">
+        <p14:creationId xmlns:p14="http://schemas.microsoft.com/office/powerpoint/2010/main" val="1337374101"/>
+      </p:ext>
+    </p:extLst>
+  </p:cSld>
+  <p:clrMapOvr>
+    <a:masterClrMapping/>
+  </p:clrMapOvr>
+  <p:timing>
+    <p:tnLst>
+      <p:par>
+        <p:cTn id="1" dur="indefinite" restart="never" nodeType="tmRoot"/>
+      </p:par>
+    </p:tnLst>
+  </p:timing>
+</p:sld>
+</file>
+
+<file path=ppt/slides/slide19.xml><?xml version="1.0" encoding="utf-8"?>
+<p:sld xmlns:a="http://schemas.openxmlformats.org/drawingml/2006/main" xmlns:r="http://schemas.openxmlformats.org/officeDocument/2006/relationships" xmlns:p="http://schemas.openxmlformats.org/presentationml/2006/main">
+  <p:cSld>
+    <p:spTree>
+      <p:nvGrpSpPr>
+        <p:cNvPr id="1" name=""/>
+        <p:cNvGrpSpPr/>
+        <p:nvPr/>
+      </p:nvGrpSpPr>
+      <p:grpSpPr>
+        <a:xfrm>
+          <a:off x="0" y="0"/>
+          <a:ext cx="0" cy="0"/>
+          <a:chOff x="0" y="0"/>
+          <a:chExt cx="0" cy="0"/>
+        </a:xfrm>
+      </p:grpSpPr>
+      <p:sp>
+        <p:nvSpPr>
+          <p:cNvPr id="4" name="TextBox 3"/>
+          <p:cNvSpPr txBox="1"/>
+          <p:nvPr/>
+        </p:nvSpPr>
+        <p:spPr>
+          <a:xfrm>
+            <a:off x="-14658" y="2157840"/>
+            <a:ext cx="2528128" cy="369332"/>
+          </a:xfrm>
+          <a:prstGeom prst="rect">
+            <a:avLst/>
+          </a:prstGeom>
+          <a:noFill/>
+        </p:spPr>
+        <p:txBody>
+          <a:bodyPr wrap="none" rtlCol="0">
+            <a:spAutoFit/>
+          </a:bodyPr>
+          <a:lstStyle/>
+          <a:p>
+            <a:r>
+              <a:rPr lang="en-US" dirty="0" smtClean="0"/>
+              <a:t>default: </a:t>
+            </a:r>
+            <a:r>
+              <a:rPr lang="en-US" dirty="0" smtClean="0">
+                <a:latin typeface="Symbol" panose="05050102010706020507" pitchFamily="18" charset="2"/>
+              </a:rPr>
+              <a:t>l</a:t>
+            </a:r>
+            <a:r>
+              <a:rPr lang="en-US" dirty="0" smtClean="0"/>
+              <a:t> </a:t>
+            </a:r>
+            <a:r>
+              <a:rPr lang="en-US" dirty="0" smtClean="0"/>
+              <a:t>= 0.01, </a:t>
+            </a:r>
+            <a:r>
+              <a:rPr lang="en-US" dirty="0">
+                <a:latin typeface="Symbol" panose="05050102010706020507" pitchFamily="18" charset="2"/>
+              </a:rPr>
+              <a:t>m</a:t>
+            </a:r>
+            <a:r>
+              <a:rPr lang="en-US" dirty="0" smtClean="0"/>
+              <a:t> </a:t>
+            </a:r>
+            <a:r>
+              <a:rPr lang="en-US" dirty="0" smtClean="0"/>
+              <a:t>= 0.1</a:t>
+            </a:r>
+            <a:endParaRPr lang="en-US" dirty="0"/>
+          </a:p>
+        </p:txBody>
+      </p:sp>
+      <p:sp>
+        <p:nvSpPr>
+          <p:cNvPr id="5" name="TextBox 7"/>
+          <p:cNvSpPr txBox="1"/>
+          <p:nvPr/>
+        </p:nvSpPr>
+        <p:spPr>
+          <a:xfrm>
+            <a:off x="3276600" y="2157840"/>
+            <a:ext cx="1406154" cy="369332"/>
+          </a:xfrm>
+          <a:prstGeom prst="rect">
+            <a:avLst/>
+          </a:prstGeom>
+          <a:noFill/>
+        </p:spPr>
+        <p:txBody>
+          <a:bodyPr wrap="none" rtlCol="0">
+            <a:spAutoFit/>
+          </a:bodyPr>
+          <a:lstStyle/>
+          <a:p>
+            <a:r>
+              <a:rPr lang="en-US" dirty="0">
+                <a:latin typeface="Symbol" panose="05050102010706020507" pitchFamily="18" charset="2"/>
+              </a:rPr>
+              <a:t>l</a:t>
+            </a:r>
+            <a:r>
+              <a:rPr lang="en-US" dirty="0" smtClean="0"/>
+              <a:t> </a:t>
+            </a:r>
+            <a:r>
+              <a:rPr lang="en-US" dirty="0" smtClean="0"/>
+              <a:t>= 0.1, </a:t>
+            </a:r>
+            <a:r>
+              <a:rPr lang="en-US" dirty="0">
+                <a:latin typeface="Symbol" panose="05050102010706020507" pitchFamily="18" charset="2"/>
+              </a:rPr>
+              <a:t>m</a:t>
+            </a:r>
+            <a:r>
+              <a:rPr lang="en-US" dirty="0" smtClean="0"/>
+              <a:t> </a:t>
+            </a:r>
+            <a:r>
+              <a:rPr lang="en-US" dirty="0" smtClean="0"/>
+              <a:t>= 1</a:t>
+            </a:r>
+            <a:endParaRPr lang="en-US" dirty="0"/>
+          </a:p>
+        </p:txBody>
+      </p:sp>
+      <p:sp>
+        <p:nvSpPr>
+          <p:cNvPr id="6" name="TextBox 8"/>
+          <p:cNvSpPr txBox="1"/>
+          <p:nvPr/>
+        </p:nvSpPr>
+        <p:spPr>
+          <a:xfrm>
+            <a:off x="228600" y="4578634"/>
+            <a:ext cx="2000869" cy="369332"/>
+          </a:xfrm>
+          <a:prstGeom prst="rect">
+            <a:avLst/>
+          </a:prstGeom>
+          <a:noFill/>
+        </p:spPr>
+        <p:txBody>
+          <a:bodyPr wrap="none" rtlCol="0">
+            <a:spAutoFit/>
+          </a:bodyPr>
+          <a:lstStyle/>
+          <a:p>
+            <a:r>
+              <a:rPr lang="en-US" dirty="0">
+                <a:latin typeface="Symbol" panose="05050102010706020507" pitchFamily="18" charset="2"/>
+              </a:rPr>
+              <a:t>l</a:t>
+            </a:r>
+            <a:r>
+              <a:rPr lang="en-US" dirty="0" smtClean="0"/>
+              <a:t> </a:t>
+            </a:r>
+            <a:r>
+              <a:rPr lang="en-US" dirty="0" smtClean="0"/>
+              <a:t>= 0.001, </a:t>
+            </a:r>
+            <a:r>
+              <a:rPr lang="en-US" dirty="0">
+                <a:latin typeface="Symbol" panose="05050102010706020507" pitchFamily="18" charset="2"/>
+              </a:rPr>
+              <a:t>m</a:t>
+            </a:r>
+            <a:r>
+              <a:rPr lang="en-US" dirty="0" smtClean="0"/>
+              <a:t> </a:t>
+            </a:r>
+            <a:r>
+              <a:rPr lang="en-US" dirty="0" smtClean="0"/>
+              <a:t>= 0.01</a:t>
+            </a:r>
+            <a:endParaRPr lang="en-US" dirty="0"/>
+          </a:p>
+        </p:txBody>
+      </p:sp>
+      <p:sp>
+        <p:nvSpPr>
+          <p:cNvPr id="7" name="TextBox 11"/>
+          <p:cNvSpPr txBox="1"/>
+          <p:nvPr/>
+        </p:nvSpPr>
+        <p:spPr>
+          <a:xfrm>
+            <a:off x="2770867" y="4598328"/>
+            <a:ext cx="2234907" cy="369332"/>
+          </a:xfrm>
+          <a:prstGeom prst="rect">
+            <a:avLst/>
+          </a:prstGeom>
+          <a:noFill/>
+        </p:spPr>
+        <p:txBody>
+          <a:bodyPr wrap="none" rtlCol="0">
+            <a:spAutoFit/>
+          </a:bodyPr>
+          <a:lstStyle/>
+          <a:p>
+            <a:r>
+              <a:rPr lang="en-US" dirty="0">
+                <a:latin typeface="Symbol" panose="05050102010706020507" pitchFamily="18" charset="2"/>
+              </a:rPr>
+              <a:t>l</a:t>
+            </a:r>
+            <a:r>
+              <a:rPr lang="en-US" dirty="0" smtClean="0"/>
+              <a:t> </a:t>
+            </a:r>
+            <a:r>
+              <a:rPr lang="en-US" dirty="0" smtClean="0"/>
+              <a:t>= 0.0001, </a:t>
+            </a:r>
+            <a:r>
+              <a:rPr lang="en-US" dirty="0">
+                <a:latin typeface="Symbol" panose="05050102010706020507" pitchFamily="18" charset="2"/>
+              </a:rPr>
+              <a:t>m</a:t>
+            </a:r>
+            <a:r>
+              <a:rPr lang="en-US" dirty="0" smtClean="0"/>
+              <a:t> </a:t>
+            </a:r>
+            <a:r>
+              <a:rPr lang="en-US" dirty="0" smtClean="0"/>
+              <a:t>= 0.001</a:t>
+            </a:r>
+            <a:endParaRPr lang="en-US" dirty="0"/>
+          </a:p>
+        </p:txBody>
+      </p:sp>
+      <p:pic>
+        <p:nvPicPr>
+          <p:cNvPr id="8" name="Image 7"/>
+          <p:cNvPicPr>
+            <a:picLocks noChangeAspect="1"/>
+          </p:cNvPicPr>
+          <p:nvPr/>
+        </p:nvPicPr>
+        <p:blipFill>
+          <a:blip r:embed="rId2"/>
+          <a:stretch>
+            <a:fillRect/>
+          </a:stretch>
+        </p:blipFill>
+        <p:spPr>
+          <a:xfrm>
+            <a:off x="4801" y="143303"/>
+            <a:ext cx="2508669" cy="2014537"/>
+          </a:xfrm>
+          <a:prstGeom prst="rect">
+            <a:avLst/>
+          </a:prstGeom>
+        </p:spPr>
+      </p:pic>
+      <p:pic>
+        <p:nvPicPr>
+          <p:cNvPr id="9" name="Image 8"/>
+          <p:cNvPicPr>
+            <a:picLocks noChangeAspect="1"/>
+          </p:cNvPicPr>
+          <p:nvPr/>
+        </p:nvPicPr>
+        <p:blipFill>
+          <a:blip r:embed="rId3"/>
+          <a:stretch>
+            <a:fillRect/>
+          </a:stretch>
+        </p:blipFill>
+        <p:spPr>
+          <a:xfrm>
+            <a:off x="2667000" y="165308"/>
+            <a:ext cx="2549067" cy="1992532"/>
+          </a:xfrm>
+          <a:prstGeom prst="rect">
+            <a:avLst/>
+          </a:prstGeom>
+        </p:spPr>
+      </p:pic>
+      <p:pic>
+        <p:nvPicPr>
+          <p:cNvPr id="10" name="Image 9"/>
           <p:cNvPicPr>
             <a:picLocks noChangeAspect="1"/>
           </p:cNvPicPr>
@@ -4718,8 +5355,8 @@
         </p:blipFill>
         <p:spPr>
           <a:xfrm>
-            <a:off x="3988346" y="3173360"/>
-            <a:ext cx="3535756" cy="2922112"/>
+            <a:off x="66252" y="2580527"/>
+            <a:ext cx="2477283" cy="1961182"/>
           </a:xfrm>
           <a:prstGeom prst="rect">
             <a:avLst/>
@@ -4728,7 +5365,7 @@
       </p:pic>
       <p:pic>
         <p:nvPicPr>
-          <p:cNvPr id="7" name="Image 6"/>
+          <p:cNvPr id="11" name="Image 10"/>
           <p:cNvPicPr>
             <a:picLocks noChangeAspect="1"/>
           </p:cNvPicPr>
@@ -4742,8 +5379,8 @@
         </p:blipFill>
         <p:spPr>
           <a:xfrm>
-            <a:off x="462222" y="3200400"/>
-            <a:ext cx="3529674" cy="2925144"/>
+            <a:off x="2667000" y="2580527"/>
+            <a:ext cx="2549067" cy="1972451"/>
           </a:xfrm>
           <a:prstGeom prst="rect">
             <a:avLst/>
@@ -4753,7 +5390,7 @@
     </p:spTree>
     <p:extLst>
       <p:ext uri="{BB962C8B-B14F-4D97-AF65-F5344CB8AC3E}">
-        <p14:creationId xmlns:p14="http://schemas.microsoft.com/office/powerpoint/2010/main" val="1129510667"/>
+        <p14:creationId xmlns:p14="http://schemas.microsoft.com/office/powerpoint/2010/main" val="981091991"/>
       </p:ext>
     </p:extLst>
   </p:cSld>
@@ -4919,6 +5556,392 @@
     <p:extLst>
       <p:ext uri="{BB962C8B-B14F-4D97-AF65-F5344CB8AC3E}">
         <p14:creationId xmlns:p14="http://schemas.microsoft.com/office/powerpoint/2010/main" val="1811690116"/>
+      </p:ext>
+    </p:extLst>
+  </p:cSld>
+  <p:clrMapOvr>
+    <a:masterClrMapping/>
+  </p:clrMapOvr>
+  <p:timing>
+    <p:tnLst>
+      <p:par>
+        <p:cTn id="1" dur="indefinite" restart="never" nodeType="tmRoot"/>
+      </p:par>
+    </p:tnLst>
+  </p:timing>
+</p:sld>
+</file>
+
+<file path=ppt/slides/slide20.xml><?xml version="1.0" encoding="utf-8"?>
+<p:sld xmlns:a="http://schemas.openxmlformats.org/drawingml/2006/main" xmlns:r="http://schemas.openxmlformats.org/officeDocument/2006/relationships" xmlns:p="http://schemas.openxmlformats.org/presentationml/2006/main">
+  <p:cSld>
+    <p:spTree>
+      <p:nvGrpSpPr>
+        <p:cNvPr id="1" name=""/>
+        <p:cNvGrpSpPr/>
+        <p:nvPr/>
+      </p:nvGrpSpPr>
+      <p:grpSpPr>
+        <a:xfrm>
+          <a:off x="0" y="0"/>
+          <a:ext cx="0" cy="0"/>
+          <a:chOff x="0" y="0"/>
+          <a:chExt cx="0" cy="0"/>
+        </a:xfrm>
+      </p:grpSpPr>
+      <p:pic>
+        <p:nvPicPr>
+          <p:cNvPr id="5" name="Image 4"/>
+          <p:cNvPicPr>
+            <a:picLocks noChangeAspect="1"/>
+          </p:cNvPicPr>
+          <p:nvPr/>
+        </p:nvPicPr>
+        <p:blipFill>
+          <a:blip r:embed="rId2"/>
+          <a:stretch>
+            <a:fillRect/>
+          </a:stretch>
+        </p:blipFill>
+        <p:spPr>
+          <a:xfrm>
+            <a:off x="2204115" y="3588771"/>
+            <a:ext cx="3248025" cy="2583429"/>
+          </a:xfrm>
+          <a:prstGeom prst="rect">
+            <a:avLst/>
+          </a:prstGeom>
+        </p:spPr>
+      </p:pic>
+      <p:pic>
+        <p:nvPicPr>
+          <p:cNvPr id="6" name="Image 5"/>
+          <p:cNvPicPr>
+            <a:picLocks noChangeAspect="1"/>
+          </p:cNvPicPr>
+          <p:nvPr/>
+        </p:nvPicPr>
+        <p:blipFill>
+          <a:blip r:embed="rId3"/>
+          <a:stretch>
+            <a:fillRect/>
+          </a:stretch>
+        </p:blipFill>
+        <p:spPr>
+          <a:xfrm>
+            <a:off x="5520660" y="447368"/>
+            <a:ext cx="3242340" cy="2581955"/>
+          </a:xfrm>
+          <a:prstGeom prst="rect">
+            <a:avLst/>
+          </a:prstGeom>
+        </p:spPr>
+      </p:pic>
+      <p:pic>
+        <p:nvPicPr>
+          <p:cNvPr id="7" name="Image 6"/>
+          <p:cNvPicPr>
+            <a:picLocks noChangeAspect="1"/>
+          </p:cNvPicPr>
+          <p:nvPr/>
+        </p:nvPicPr>
+        <p:blipFill>
+          <a:blip r:embed="rId4"/>
+          <a:stretch>
+            <a:fillRect/>
+          </a:stretch>
+        </p:blipFill>
+        <p:spPr>
+          <a:xfrm>
+            <a:off x="2204115" y="447368"/>
+            <a:ext cx="3246172" cy="2581955"/>
+          </a:xfrm>
+          <a:prstGeom prst="rect">
+            <a:avLst/>
+          </a:prstGeom>
+        </p:spPr>
+      </p:pic>
+      <p:pic>
+        <p:nvPicPr>
+          <p:cNvPr id="8" name="Image 7"/>
+          <p:cNvPicPr>
+            <a:picLocks noChangeAspect="1"/>
+          </p:cNvPicPr>
+          <p:nvPr/>
+        </p:nvPicPr>
+        <p:blipFill>
+          <a:blip r:embed="rId5"/>
+          <a:stretch>
+            <a:fillRect/>
+          </a:stretch>
+        </p:blipFill>
+        <p:spPr>
+          <a:xfrm>
+            <a:off x="5552615" y="3588771"/>
+            <a:ext cx="3210385" cy="2570866"/>
+          </a:xfrm>
+          <a:prstGeom prst="rect">
+            <a:avLst/>
+          </a:prstGeom>
+        </p:spPr>
+      </p:pic>
+      <p:sp>
+        <p:nvSpPr>
+          <p:cNvPr id="9" name="ZoneTexte 8"/>
+          <p:cNvSpPr txBox="1"/>
+          <p:nvPr/>
+        </p:nvSpPr>
+        <p:spPr>
+          <a:xfrm>
+            <a:off x="2667000" y="3029323"/>
+            <a:ext cx="2452787" cy="369332"/>
+          </a:xfrm>
+          <a:prstGeom prst="rect">
+            <a:avLst/>
+          </a:prstGeom>
+          <a:noFill/>
+        </p:spPr>
+        <p:txBody>
+          <a:bodyPr wrap="none" rtlCol="0">
+            <a:spAutoFit/>
+          </a:bodyPr>
+          <a:lstStyle/>
+          <a:p>
+            <a:r>
+              <a:rPr lang="en-GB" dirty="0" smtClean="0"/>
+              <a:t>Epoch 1: Principal Curve</a:t>
+            </a:r>
+            <a:endParaRPr lang="en-GB" dirty="0"/>
+          </a:p>
+        </p:txBody>
+      </p:sp>
+      <p:sp>
+        <p:nvSpPr>
+          <p:cNvPr id="10" name="ZoneTexte 9"/>
+          <p:cNvSpPr txBox="1"/>
+          <p:nvPr/>
+        </p:nvSpPr>
+        <p:spPr>
+          <a:xfrm>
+            <a:off x="2073066" y="6159637"/>
+            <a:ext cx="3718134" cy="369332"/>
+          </a:xfrm>
+          <a:prstGeom prst="rect">
+            <a:avLst/>
+          </a:prstGeom>
+          <a:noFill/>
+        </p:spPr>
+        <p:txBody>
+          <a:bodyPr wrap="none" rtlCol="0">
+            <a:spAutoFit/>
+          </a:bodyPr>
+          <a:lstStyle/>
+          <a:p>
+            <a:r>
+              <a:rPr lang="en-GB" dirty="0" smtClean="0"/>
+              <a:t>Epoch 3: Robust Local Principal Graph</a:t>
+            </a:r>
+            <a:endParaRPr lang="en-GB" dirty="0"/>
+          </a:p>
+        </p:txBody>
+      </p:sp>
+      <p:sp>
+        <p:nvSpPr>
+          <p:cNvPr id="11" name="ZoneTexte 10"/>
+          <p:cNvSpPr txBox="1"/>
+          <p:nvPr/>
+        </p:nvSpPr>
+        <p:spPr>
+          <a:xfrm>
+            <a:off x="5638800" y="3029323"/>
+            <a:ext cx="3142270" cy="369332"/>
+          </a:xfrm>
+          <a:prstGeom prst="rect">
+            <a:avLst/>
+          </a:prstGeom>
+          <a:noFill/>
+        </p:spPr>
+        <p:txBody>
+          <a:bodyPr wrap="none" rtlCol="0">
+            <a:spAutoFit/>
+          </a:bodyPr>
+          <a:lstStyle/>
+          <a:p>
+            <a:r>
+              <a:rPr lang="en-GB" dirty="0" smtClean="0"/>
+              <a:t>Epoch 2: Global Principal Graph</a:t>
+            </a:r>
+            <a:endParaRPr lang="en-GB" dirty="0"/>
+          </a:p>
+        </p:txBody>
+      </p:sp>
+      <p:sp>
+        <p:nvSpPr>
+          <p:cNvPr id="13" name="ZoneTexte 12"/>
+          <p:cNvSpPr txBox="1"/>
+          <p:nvPr/>
+        </p:nvSpPr>
+        <p:spPr>
+          <a:xfrm>
+            <a:off x="5867400" y="6159637"/>
+            <a:ext cx="2802434" cy="369332"/>
+          </a:xfrm>
+          <a:prstGeom prst="rect">
+            <a:avLst/>
+          </a:prstGeom>
+          <a:noFill/>
+        </p:spPr>
+        <p:txBody>
+          <a:bodyPr wrap="none" rtlCol="0">
+            <a:spAutoFit/>
+          </a:bodyPr>
+          <a:lstStyle/>
+          <a:p>
+            <a:r>
+              <a:rPr lang="en-GB" dirty="0" smtClean="0"/>
+              <a:t>Resulting Metro Map layout</a:t>
+            </a:r>
+            <a:endParaRPr lang="en-GB" dirty="0"/>
+          </a:p>
+        </p:txBody>
+      </p:sp>
+    </p:spTree>
+    <p:extLst>
+      <p:ext uri="{BB962C8B-B14F-4D97-AF65-F5344CB8AC3E}">
+        <p14:creationId xmlns:p14="http://schemas.microsoft.com/office/powerpoint/2010/main" val="241097133"/>
+      </p:ext>
+    </p:extLst>
+  </p:cSld>
+  <p:clrMapOvr>
+    <a:masterClrMapping/>
+  </p:clrMapOvr>
+  <p:timing>
+    <p:tnLst>
+      <p:par>
+        <p:cTn id="1" dur="indefinite" restart="never" nodeType="tmRoot"/>
+      </p:par>
+    </p:tnLst>
+  </p:timing>
+</p:sld>
+</file>
+
+<file path=ppt/slides/slide21.xml><?xml version="1.0" encoding="utf-8"?>
+<p:sld xmlns:a="http://schemas.openxmlformats.org/drawingml/2006/main" xmlns:r="http://schemas.openxmlformats.org/officeDocument/2006/relationships" xmlns:p="http://schemas.openxmlformats.org/presentationml/2006/main">
+  <p:cSld>
+    <p:spTree>
+      <p:nvGrpSpPr>
+        <p:cNvPr id="1" name=""/>
+        <p:cNvGrpSpPr/>
+        <p:nvPr/>
+      </p:nvGrpSpPr>
+      <p:grpSpPr>
+        <a:xfrm>
+          <a:off x="0" y="0"/>
+          <a:ext cx="0" cy="0"/>
+          <a:chOff x="0" y="0"/>
+          <a:chExt cx="0" cy="0"/>
+        </a:xfrm>
+      </p:grpSpPr>
+      <p:pic>
+        <p:nvPicPr>
+          <p:cNvPr id="5" name="Image 4"/>
+          <p:cNvPicPr>
+            <a:picLocks noChangeAspect="1"/>
+          </p:cNvPicPr>
+          <p:nvPr/>
+        </p:nvPicPr>
+        <p:blipFill>
+          <a:blip r:embed="rId2"/>
+          <a:stretch>
+            <a:fillRect/>
+          </a:stretch>
+        </p:blipFill>
+        <p:spPr>
+          <a:xfrm>
+            <a:off x="441052" y="324464"/>
+            <a:ext cx="3550844" cy="2895600"/>
+          </a:xfrm>
+          <a:prstGeom prst="rect">
+            <a:avLst/>
+          </a:prstGeom>
+        </p:spPr>
+      </p:pic>
+      <p:pic>
+        <p:nvPicPr>
+          <p:cNvPr id="3" name="Image 2"/>
+          <p:cNvPicPr>
+            <a:picLocks noChangeAspect="1"/>
+          </p:cNvPicPr>
+          <p:nvPr/>
+        </p:nvPicPr>
+        <p:blipFill>
+          <a:blip r:embed="rId3"/>
+          <a:stretch>
+            <a:fillRect/>
+          </a:stretch>
+        </p:blipFill>
+        <p:spPr>
+          <a:xfrm>
+            <a:off x="3896032" y="324464"/>
+            <a:ext cx="3577576" cy="2848898"/>
+          </a:xfrm>
+          <a:prstGeom prst="rect">
+            <a:avLst/>
+          </a:prstGeom>
+        </p:spPr>
+      </p:pic>
+      <p:pic>
+        <p:nvPicPr>
+          <p:cNvPr id="4" name="Image 3"/>
+          <p:cNvPicPr>
+            <a:picLocks noChangeAspect="1"/>
+          </p:cNvPicPr>
+          <p:nvPr/>
+        </p:nvPicPr>
+        <p:blipFill>
+          <a:blip r:embed="rId4"/>
+          <a:stretch>
+            <a:fillRect/>
+          </a:stretch>
+        </p:blipFill>
+        <p:spPr>
+          <a:xfrm>
+            <a:off x="3988346" y="3173360"/>
+            <a:ext cx="3535756" cy="2922112"/>
+          </a:xfrm>
+          <a:prstGeom prst="rect">
+            <a:avLst/>
+          </a:prstGeom>
+        </p:spPr>
+      </p:pic>
+      <p:pic>
+        <p:nvPicPr>
+          <p:cNvPr id="7" name="Image 6"/>
+          <p:cNvPicPr>
+            <a:picLocks noChangeAspect="1"/>
+          </p:cNvPicPr>
+          <p:nvPr/>
+        </p:nvPicPr>
+        <p:blipFill>
+          <a:blip r:embed="rId5"/>
+          <a:stretch>
+            <a:fillRect/>
+          </a:stretch>
+        </p:blipFill>
+        <p:spPr>
+          <a:xfrm>
+            <a:off x="462222" y="3200400"/>
+            <a:ext cx="3529674" cy="2925144"/>
+          </a:xfrm>
+          <a:prstGeom prst="rect">
+            <a:avLst/>
+          </a:prstGeom>
+        </p:spPr>
+      </p:pic>
+    </p:spTree>
+    <p:extLst>
+      <p:ext uri="{BB962C8B-B14F-4D97-AF65-F5344CB8AC3E}">
+        <p14:creationId xmlns:p14="http://schemas.microsoft.com/office/powerpoint/2010/main" val="1129510667"/>
       </p:ext>
     </p:extLst>
   </p:cSld>

</xml_diff>

<commit_message>
modifying the branching control illustration
</commit_message>
<xml_diff>
--- a/FiguresWiki/Examples.pptx
+++ b/FiguresWiki/Examples.pptx
@@ -26,6 +26,7 @@
     <p:sldId id="272" r:id="rId20"/>
     <p:sldId id="273" r:id="rId21"/>
     <p:sldId id="271" r:id="rId22"/>
+    <p:sldId id="277" r:id="rId23"/>
   </p:sldIdLst>
   <p:sldSz cx="9144000" cy="6858000" type="screen4x3"/>
   <p:notesSz cx="6858000" cy="9144000"/>
@@ -324,7 +325,7 @@
           <a:p>
             <a:fld id="{4AF8D1E4-79D5-419A-84F5-5184F8D0060F}" type="datetimeFigureOut">
               <a:rPr lang="en-US" smtClean="0"/>
-              <a:t>11/6/2017</a:t>
+              <a:t>2/27/2018</a:t>
             </a:fld>
             <a:endParaRPr lang="en-US" dirty="0"/>
           </a:p>
@@ -494,7 +495,7 @@
           <a:p>
             <a:fld id="{4AF8D1E4-79D5-419A-84F5-5184F8D0060F}" type="datetimeFigureOut">
               <a:rPr lang="en-US" smtClean="0"/>
-              <a:t>11/6/2017</a:t>
+              <a:t>2/27/2018</a:t>
             </a:fld>
             <a:endParaRPr lang="en-US" dirty="0"/>
           </a:p>
@@ -674,7 +675,7 @@
           <a:p>
             <a:fld id="{4AF8D1E4-79D5-419A-84F5-5184F8D0060F}" type="datetimeFigureOut">
               <a:rPr lang="en-US" smtClean="0"/>
-              <a:t>11/6/2017</a:t>
+              <a:t>2/27/2018</a:t>
             </a:fld>
             <a:endParaRPr lang="en-US" dirty="0"/>
           </a:p>
@@ -844,7 +845,7 @@
           <a:p>
             <a:fld id="{4AF8D1E4-79D5-419A-84F5-5184F8D0060F}" type="datetimeFigureOut">
               <a:rPr lang="en-US" smtClean="0"/>
-              <a:t>11/6/2017</a:t>
+              <a:t>2/27/2018</a:t>
             </a:fld>
             <a:endParaRPr lang="en-US" dirty="0"/>
           </a:p>
@@ -1090,7 +1091,7 @@
           <a:p>
             <a:fld id="{4AF8D1E4-79D5-419A-84F5-5184F8D0060F}" type="datetimeFigureOut">
               <a:rPr lang="en-US" smtClean="0"/>
-              <a:t>11/6/2017</a:t>
+              <a:t>2/27/2018</a:t>
             </a:fld>
             <a:endParaRPr lang="en-US" dirty="0"/>
           </a:p>
@@ -1378,7 +1379,7 @@
           <a:p>
             <a:fld id="{4AF8D1E4-79D5-419A-84F5-5184F8D0060F}" type="datetimeFigureOut">
               <a:rPr lang="en-US" smtClean="0"/>
-              <a:t>11/6/2017</a:t>
+              <a:t>2/27/2018</a:t>
             </a:fld>
             <a:endParaRPr lang="en-US" dirty="0"/>
           </a:p>
@@ -1800,7 +1801,7 @@
           <a:p>
             <a:fld id="{4AF8D1E4-79D5-419A-84F5-5184F8D0060F}" type="datetimeFigureOut">
               <a:rPr lang="en-US" smtClean="0"/>
-              <a:t>11/6/2017</a:t>
+              <a:t>2/27/2018</a:t>
             </a:fld>
             <a:endParaRPr lang="en-US" dirty="0"/>
           </a:p>
@@ -1918,7 +1919,7 @@
           <a:p>
             <a:fld id="{4AF8D1E4-79D5-419A-84F5-5184F8D0060F}" type="datetimeFigureOut">
               <a:rPr lang="en-US" smtClean="0"/>
-              <a:t>11/6/2017</a:t>
+              <a:t>2/27/2018</a:t>
             </a:fld>
             <a:endParaRPr lang="en-US" dirty="0"/>
           </a:p>
@@ -2013,7 +2014,7 @@
           <a:p>
             <a:fld id="{4AF8D1E4-79D5-419A-84F5-5184F8D0060F}" type="datetimeFigureOut">
               <a:rPr lang="en-US" smtClean="0"/>
-              <a:t>11/6/2017</a:t>
+              <a:t>2/27/2018</a:t>
             </a:fld>
             <a:endParaRPr lang="en-US" dirty="0"/>
           </a:p>
@@ -2290,7 +2291,7 @@
           <a:p>
             <a:fld id="{4AF8D1E4-79D5-419A-84F5-5184F8D0060F}" type="datetimeFigureOut">
               <a:rPr lang="en-US" smtClean="0"/>
-              <a:t>11/6/2017</a:t>
+              <a:t>2/27/2018</a:t>
             </a:fld>
             <a:endParaRPr lang="en-US" dirty="0"/>
           </a:p>
@@ -2543,7 +2544,7 @@
           <a:p>
             <a:fld id="{4AF8D1E4-79D5-419A-84F5-5184F8D0060F}" type="datetimeFigureOut">
               <a:rPr lang="en-US" smtClean="0"/>
-              <a:t>11/6/2017</a:t>
+              <a:t>2/27/2018</a:t>
             </a:fld>
             <a:endParaRPr lang="en-US" dirty="0"/>
           </a:p>
@@ -2756,7 +2757,7 @@
           <a:p>
             <a:fld id="{4AF8D1E4-79D5-419A-84F5-5184F8D0060F}" type="datetimeFigureOut">
               <a:rPr lang="en-US" smtClean="0"/>
-              <a:t>11/6/2017</a:t>
+              <a:t>2/27/2018</a:t>
             </a:fld>
             <a:endParaRPr lang="en-US" dirty="0"/>
           </a:p>
@@ -5105,11 +5106,7 @@
             </a:r>
             <a:r>
               <a:rPr lang="en-US" dirty="0" smtClean="0"/>
-              <a:t> </a:t>
-            </a:r>
-            <a:r>
-              <a:rPr lang="en-US" dirty="0" smtClean="0"/>
-              <a:t>= 0.01, </a:t>
+              <a:t> = 0.01, </a:t>
             </a:r>
             <a:r>
               <a:rPr lang="en-US" dirty="0">
@@ -5119,11 +5116,7 @@
             </a:r>
             <a:r>
               <a:rPr lang="en-US" dirty="0" smtClean="0"/>
-              <a:t> </a:t>
-            </a:r>
-            <a:r>
-              <a:rPr lang="en-US" dirty="0" smtClean="0"/>
-              <a:t>= 0.1</a:t>
+              <a:t> = 0.1</a:t>
             </a:r>
             <a:endParaRPr lang="en-US" dirty="0"/>
           </a:p>
@@ -5159,11 +5152,7 @@
             </a:r>
             <a:r>
               <a:rPr lang="en-US" dirty="0" smtClean="0"/>
-              <a:t> </a:t>
-            </a:r>
-            <a:r>
-              <a:rPr lang="en-US" dirty="0" smtClean="0"/>
-              <a:t>= 0.1, </a:t>
+              <a:t> = 0.1, </a:t>
             </a:r>
             <a:r>
               <a:rPr lang="en-US" dirty="0">
@@ -5173,11 +5162,7 @@
             </a:r>
             <a:r>
               <a:rPr lang="en-US" dirty="0" smtClean="0"/>
-              <a:t> </a:t>
-            </a:r>
-            <a:r>
-              <a:rPr lang="en-US" dirty="0" smtClean="0"/>
-              <a:t>= 1</a:t>
+              <a:t> = 1</a:t>
             </a:r>
             <a:endParaRPr lang="en-US" dirty="0"/>
           </a:p>
@@ -5213,11 +5198,7 @@
             </a:r>
             <a:r>
               <a:rPr lang="en-US" dirty="0" smtClean="0"/>
-              <a:t> </a:t>
-            </a:r>
-            <a:r>
-              <a:rPr lang="en-US" dirty="0" smtClean="0"/>
-              <a:t>= 0.001, </a:t>
+              <a:t> = 0.001, </a:t>
             </a:r>
             <a:r>
               <a:rPr lang="en-US" dirty="0">
@@ -5227,11 +5208,7 @@
             </a:r>
             <a:r>
               <a:rPr lang="en-US" dirty="0" smtClean="0"/>
-              <a:t> </a:t>
-            </a:r>
-            <a:r>
-              <a:rPr lang="en-US" dirty="0" smtClean="0"/>
-              <a:t>= 0.01</a:t>
+              <a:t> = 0.01</a:t>
             </a:r>
             <a:endParaRPr lang="en-US" dirty="0"/>
           </a:p>
@@ -5267,11 +5244,7 @@
             </a:r>
             <a:r>
               <a:rPr lang="en-US" dirty="0" smtClean="0"/>
-              <a:t> </a:t>
-            </a:r>
-            <a:r>
-              <a:rPr lang="en-US" dirty="0" smtClean="0"/>
-              <a:t>= 0.0001, </a:t>
+              <a:t> = 0.0001, </a:t>
             </a:r>
             <a:r>
               <a:rPr lang="en-US" dirty="0">
@@ -5281,11 +5254,7 @@
             </a:r>
             <a:r>
               <a:rPr lang="en-US" dirty="0" smtClean="0"/>
-              <a:t> </a:t>
-            </a:r>
-            <a:r>
-              <a:rPr lang="en-US" dirty="0" smtClean="0"/>
-              <a:t>= 0.001</a:t>
+              <a:t> = 0.001</a:t>
             </a:r>
             <a:endParaRPr lang="en-US" dirty="0"/>
           </a:p>
@@ -5955,6 +5924,431 @@
       </p:par>
     </p:tnLst>
   </p:timing>
+</p:sld>
+</file>
+
+<file path=ppt/slides/slide22.xml><?xml version="1.0" encoding="utf-8"?>
+<p:sld xmlns:a="http://schemas.openxmlformats.org/drawingml/2006/main" xmlns:r="http://schemas.openxmlformats.org/officeDocument/2006/relationships" xmlns:p="http://schemas.openxmlformats.org/presentationml/2006/main">
+  <p:cSld>
+    <p:spTree>
+      <p:nvGrpSpPr>
+        <p:cNvPr id="1" name=""/>
+        <p:cNvGrpSpPr/>
+        <p:nvPr/>
+      </p:nvGrpSpPr>
+      <p:grpSpPr>
+        <a:xfrm>
+          <a:off x="0" y="0"/>
+          <a:ext cx="0" cy="0"/>
+          <a:chOff x="0" y="0"/>
+          <a:chExt cx="0" cy="0"/>
+        </a:xfrm>
+      </p:grpSpPr>
+      <p:pic>
+        <p:nvPicPr>
+          <p:cNvPr id="14" name="Image 13"/>
+          <p:cNvPicPr>
+            <a:picLocks noChangeAspect="1"/>
+          </p:cNvPicPr>
+          <p:nvPr/>
+        </p:nvPicPr>
+        <p:blipFill>
+          <a:blip r:embed="rId2"/>
+          <a:stretch>
+            <a:fillRect/>
+          </a:stretch>
+        </p:blipFill>
+        <p:spPr>
+          <a:xfrm>
+            <a:off x="488889" y="3291487"/>
+            <a:ext cx="3567278" cy="2800934"/>
+          </a:xfrm>
+          <a:prstGeom prst="rect">
+            <a:avLst/>
+          </a:prstGeom>
+        </p:spPr>
+      </p:pic>
+      <p:pic>
+        <p:nvPicPr>
+          <p:cNvPr id="4" name="Image 3"/>
+          <p:cNvPicPr>
+            <a:picLocks noChangeAspect="1"/>
+          </p:cNvPicPr>
+          <p:nvPr/>
+        </p:nvPicPr>
+        <p:blipFill>
+          <a:blip r:embed="rId3"/>
+          <a:stretch>
+            <a:fillRect/>
+          </a:stretch>
+        </p:blipFill>
+        <p:spPr>
+          <a:xfrm>
+            <a:off x="488889" y="134593"/>
+            <a:ext cx="3722810" cy="2946516"/>
+          </a:xfrm>
+          <a:prstGeom prst="rect">
+            <a:avLst/>
+          </a:prstGeom>
+        </p:spPr>
+      </p:pic>
+      <p:sp>
+        <p:nvSpPr>
+          <p:cNvPr id="5" name="ZoneTexte 4"/>
+          <p:cNvSpPr txBox="1"/>
+          <p:nvPr/>
+        </p:nvSpPr>
+        <p:spPr>
+          <a:xfrm>
+            <a:off x="4317919" y="303322"/>
+            <a:ext cx="3660554" cy="1754326"/>
+          </a:xfrm>
+          <a:prstGeom prst="rect">
+            <a:avLst/>
+          </a:prstGeom>
+          <a:noFill/>
+        </p:spPr>
+        <p:txBody>
+          <a:bodyPr wrap="none" rtlCol="0">
+            <a:spAutoFit/>
+          </a:bodyPr>
+          <a:lstStyle/>
+          <a:p>
+            <a:r>
+              <a:rPr lang="en-GB" dirty="0" smtClean="0"/>
+              <a:t>The tree contains three branching </a:t>
+            </a:r>
+          </a:p>
+          <a:p>
+            <a:r>
+              <a:rPr lang="en-GB" dirty="0" smtClean="0"/>
+              <a:t>points, two of which appear because</a:t>
+            </a:r>
+          </a:p>
+          <a:p>
+            <a:r>
+              <a:rPr lang="en-GB" dirty="0" smtClean="0"/>
+              <a:t>of the “thick turn” feature (increased</a:t>
+            </a:r>
+          </a:p>
+          <a:p>
+            <a:r>
+              <a:rPr lang="en-GB" dirty="0" smtClean="0"/>
+              <a:t>variance in the area of the maximal </a:t>
+            </a:r>
+          </a:p>
+          <a:p>
+            <a:r>
+              <a:rPr lang="en-GB" dirty="0"/>
+              <a:t>c</a:t>
+            </a:r>
+            <a:r>
+              <a:rPr lang="en-GB" dirty="0" smtClean="0"/>
+              <a:t>urvature of a hypothetical principal </a:t>
+            </a:r>
+          </a:p>
+          <a:p>
+            <a:r>
+              <a:rPr lang="en-GB" dirty="0" smtClean="0"/>
+              <a:t>curve)</a:t>
+            </a:r>
+          </a:p>
+        </p:txBody>
+      </p:sp>
+      <p:pic>
+        <p:nvPicPr>
+          <p:cNvPr id="6" name="Image 5"/>
+          <p:cNvPicPr>
+            <a:picLocks noChangeAspect="1"/>
+          </p:cNvPicPr>
+          <p:nvPr/>
+        </p:nvPicPr>
+        <p:blipFill>
+          <a:blip r:embed="rId4"/>
+          <a:stretch>
+            <a:fillRect/>
+          </a:stretch>
+        </p:blipFill>
+        <p:spPr>
+          <a:xfrm>
+            <a:off x="3664369" y="2197780"/>
+            <a:ext cx="1730289" cy="1352550"/>
+          </a:xfrm>
+          <a:prstGeom prst="rect">
+            <a:avLst/>
+          </a:prstGeom>
+          <a:ln>
+            <a:solidFill>
+              <a:schemeClr val="tx1"/>
+            </a:solidFill>
+          </a:ln>
+        </p:spPr>
+      </p:pic>
+      <p:sp>
+        <p:nvSpPr>
+          <p:cNvPr id="7" name="Rectangle 6"/>
+          <p:cNvSpPr/>
+          <p:nvPr/>
+        </p:nvSpPr>
+        <p:spPr>
+          <a:xfrm>
+            <a:off x="2425386" y="1218337"/>
+            <a:ext cx="1143000" cy="1143000"/>
+          </a:xfrm>
+          <a:prstGeom prst="rect">
+            <a:avLst/>
+          </a:prstGeom>
+          <a:noFill/>
+          <a:ln>
+            <a:solidFill>
+              <a:schemeClr val="tx1"/>
+            </a:solidFill>
+          </a:ln>
+        </p:spPr>
+        <p:style>
+          <a:lnRef idx="2">
+            <a:schemeClr val="accent1">
+              <a:shade val="50000"/>
+            </a:schemeClr>
+          </a:lnRef>
+          <a:fillRef idx="1">
+            <a:schemeClr val="accent1"/>
+          </a:fillRef>
+          <a:effectRef idx="0">
+            <a:schemeClr val="accent1"/>
+          </a:effectRef>
+          <a:fontRef idx="minor">
+            <a:schemeClr val="lt1"/>
+          </a:fontRef>
+        </p:style>
+        <p:txBody>
+          <a:bodyPr rtlCol="0" anchor="ctr"/>
+          <a:lstStyle/>
+          <a:p>
+            <a:pPr algn="ctr"/>
+            <a:endParaRPr lang="en-GB"/>
+          </a:p>
+        </p:txBody>
+      </p:sp>
+      <p:cxnSp>
+        <p:nvCxnSpPr>
+          <p:cNvPr id="9" name="Connecteur droit 8"/>
+          <p:cNvCxnSpPr/>
+          <p:nvPr/>
+        </p:nvCxnSpPr>
+        <p:spPr>
+          <a:xfrm>
+            <a:off x="3568386" y="1218337"/>
+            <a:ext cx="1826272" cy="979443"/>
+          </a:xfrm>
+          <a:prstGeom prst="line">
+            <a:avLst/>
+          </a:prstGeom>
+          <a:ln>
+            <a:solidFill>
+              <a:schemeClr val="tx1"/>
+            </a:solidFill>
+          </a:ln>
+        </p:spPr>
+        <p:style>
+          <a:lnRef idx="1">
+            <a:schemeClr val="accent1"/>
+          </a:lnRef>
+          <a:fillRef idx="0">
+            <a:schemeClr val="accent1"/>
+          </a:fillRef>
+          <a:effectRef idx="0">
+            <a:schemeClr val="accent1"/>
+          </a:effectRef>
+          <a:fontRef idx="minor">
+            <a:schemeClr val="tx1"/>
+          </a:fontRef>
+        </p:style>
+      </p:cxnSp>
+      <p:cxnSp>
+        <p:nvCxnSpPr>
+          <p:cNvPr id="10" name="Connecteur droit 9"/>
+          <p:cNvCxnSpPr/>
+          <p:nvPr/>
+        </p:nvCxnSpPr>
+        <p:spPr>
+          <a:xfrm>
+            <a:off x="2425386" y="2401163"/>
+            <a:ext cx="1234793" cy="1143000"/>
+          </a:xfrm>
+          <a:prstGeom prst="line">
+            <a:avLst/>
+          </a:prstGeom>
+          <a:ln>
+            <a:solidFill>
+              <a:schemeClr val="tx1"/>
+            </a:solidFill>
+          </a:ln>
+        </p:spPr>
+        <p:style>
+          <a:lnRef idx="1">
+            <a:schemeClr val="accent1"/>
+          </a:lnRef>
+          <a:fillRef idx="0">
+            <a:schemeClr val="accent1"/>
+          </a:fillRef>
+          <a:effectRef idx="0">
+            <a:schemeClr val="accent1"/>
+          </a:effectRef>
+          <a:fontRef idx="minor">
+            <a:schemeClr val="tx1"/>
+          </a:fontRef>
+        </p:style>
+      </p:cxnSp>
+      <p:sp>
+        <p:nvSpPr>
+          <p:cNvPr id="12" name="ZoneTexte 11"/>
+          <p:cNvSpPr txBox="1"/>
+          <p:nvPr/>
+        </p:nvSpPr>
+        <p:spPr>
+          <a:xfrm>
+            <a:off x="762000" y="188649"/>
+            <a:ext cx="1043876" cy="584775"/>
+          </a:xfrm>
+          <a:prstGeom prst="rect">
+            <a:avLst/>
+          </a:prstGeom>
+          <a:noFill/>
+        </p:spPr>
+        <p:txBody>
+          <a:bodyPr wrap="none" rtlCol="0">
+            <a:spAutoFit/>
+          </a:bodyPr>
+          <a:lstStyle/>
+          <a:p>
+            <a:r>
+              <a:rPr lang="en-GB" sz="3200" dirty="0" smtClean="0">
+                <a:latin typeface="Symbol" panose="05050102010706020507" pitchFamily="18" charset="2"/>
+              </a:rPr>
+              <a:t>a</a:t>
+            </a:r>
+            <a:r>
+              <a:rPr lang="en-GB" sz="3200" dirty="0" smtClean="0"/>
+              <a:t> = 0</a:t>
+            </a:r>
+            <a:endParaRPr lang="en-GB" sz="3200" dirty="0"/>
+          </a:p>
+        </p:txBody>
+      </p:sp>
+      <p:sp>
+        <p:nvSpPr>
+          <p:cNvPr id="13" name="ZoneTexte 12"/>
+          <p:cNvSpPr txBox="1"/>
+          <p:nvPr/>
+        </p:nvSpPr>
+        <p:spPr>
+          <a:xfrm>
+            <a:off x="4329278" y="3690462"/>
+            <a:ext cx="3556295" cy="2031325"/>
+          </a:xfrm>
+          <a:prstGeom prst="rect">
+            <a:avLst/>
+          </a:prstGeom>
+          <a:noFill/>
+        </p:spPr>
+        <p:txBody>
+          <a:bodyPr wrap="none" rtlCol="0">
+            <a:spAutoFit/>
+          </a:bodyPr>
+          <a:lstStyle/>
+          <a:p>
+            <a:r>
+              <a:rPr lang="en-GB" dirty="0" smtClean="0"/>
+              <a:t>The tree contains only one essential</a:t>
+            </a:r>
+          </a:p>
+          <a:p>
+            <a:r>
+              <a:rPr lang="en-GB" dirty="0"/>
+              <a:t>b</a:t>
+            </a:r>
+            <a:r>
+              <a:rPr lang="en-GB" dirty="0" smtClean="0"/>
+              <a:t>ranching point, because</a:t>
+            </a:r>
+          </a:p>
+          <a:p>
+            <a:r>
+              <a:rPr lang="en-GB" dirty="0"/>
+              <a:t>b</a:t>
+            </a:r>
+            <a:r>
+              <a:rPr lang="en-GB" dirty="0" smtClean="0"/>
+              <a:t>ranching control penalty supresses</a:t>
+            </a:r>
+          </a:p>
+          <a:p>
+            <a:r>
+              <a:rPr lang="en-GB" dirty="0" smtClean="0"/>
+              <a:t>appearance of suboptimal small </a:t>
+            </a:r>
+          </a:p>
+          <a:p>
+            <a:r>
+              <a:rPr lang="en-GB" dirty="0" smtClean="0"/>
+              <a:t>branches in the “thick turn” area</a:t>
+            </a:r>
+          </a:p>
+          <a:p>
+            <a:r>
+              <a:rPr lang="en-GB" dirty="0" smtClean="0"/>
+              <a:t>of the data distribution</a:t>
+            </a:r>
+          </a:p>
+          <a:p>
+            <a:endParaRPr lang="en-GB" dirty="0" smtClean="0"/>
+          </a:p>
+        </p:txBody>
+      </p:sp>
+      <p:sp>
+        <p:nvSpPr>
+          <p:cNvPr id="19" name="ZoneTexte 18"/>
+          <p:cNvSpPr txBox="1"/>
+          <p:nvPr/>
+        </p:nvSpPr>
+        <p:spPr>
+          <a:xfrm>
+            <a:off x="762000" y="3291487"/>
+            <a:ext cx="1673856" cy="584775"/>
+          </a:xfrm>
+          <a:prstGeom prst="rect">
+            <a:avLst/>
+          </a:prstGeom>
+          <a:noFill/>
+        </p:spPr>
+        <p:txBody>
+          <a:bodyPr wrap="none" rtlCol="0">
+            <a:spAutoFit/>
+          </a:bodyPr>
+          <a:lstStyle/>
+          <a:p>
+            <a:pPr marL="457200" indent="-457200">
+              <a:buFont typeface="Symbol" panose="05050102010706020507" pitchFamily="18" charset="2"/>
+              <a:buChar char="a"/>
+            </a:pPr>
+            <a:r>
+              <a:rPr lang="en-GB" sz="3200" dirty="0" smtClean="0"/>
+              <a:t>= 0.01</a:t>
+            </a:r>
+          </a:p>
+        </p:txBody>
+      </p:sp>
+    </p:spTree>
+    <p:extLst>
+      <p:ext uri="{BB962C8B-B14F-4D97-AF65-F5344CB8AC3E}">
+        <p14:creationId xmlns:p14="http://schemas.microsoft.com/office/powerpoint/2010/main" val="1070100654"/>
+      </p:ext>
+    </p:extLst>
+  </p:cSld>
+  <p:clrMapOvr>
+    <a:masterClrMapping/>
+  </p:clrMapOvr>
 </p:sld>
 </file>
 

</xml_diff>

<commit_message>
simple circle branching example
</commit_message>
<xml_diff>
--- a/FiguresWiki/Examples.pptx
+++ b/FiguresWiki/Examples.pptx
@@ -27,6 +27,8 @@
     <p:sldId id="273" r:id="rId21"/>
     <p:sldId id="271" r:id="rId22"/>
     <p:sldId id="277" r:id="rId23"/>
+    <p:sldId id="278" r:id="rId24"/>
+    <p:sldId id="279" r:id="rId25"/>
   </p:sldIdLst>
   <p:sldSz cx="9144000" cy="6858000" type="screen4x3"/>
   <p:notesSz cx="6858000" cy="9144000"/>
@@ -6349,6 +6351,806 @@
   <p:clrMapOvr>
     <a:masterClrMapping/>
   </p:clrMapOvr>
+  <p:timing>
+    <p:tnLst>
+      <p:par>
+        <p:cTn id="1" dur="indefinite" restart="never" nodeType="tmRoot"/>
+      </p:par>
+    </p:tnLst>
+  </p:timing>
+</p:sld>
+</file>
+
+<file path=ppt/slides/slide23.xml><?xml version="1.0" encoding="utf-8"?>
+<p:sld xmlns:a="http://schemas.openxmlformats.org/drawingml/2006/main" xmlns:r="http://schemas.openxmlformats.org/officeDocument/2006/relationships" xmlns:p="http://schemas.openxmlformats.org/presentationml/2006/main">
+  <p:cSld>
+    <p:spTree>
+      <p:nvGrpSpPr>
+        <p:cNvPr id="1" name=""/>
+        <p:cNvGrpSpPr/>
+        <p:nvPr/>
+      </p:nvGrpSpPr>
+      <p:grpSpPr>
+        <a:xfrm>
+          <a:off x="0" y="0"/>
+          <a:ext cx="0" cy="0"/>
+          <a:chOff x="0" y="0"/>
+          <a:chExt cx="0" cy="0"/>
+        </a:xfrm>
+      </p:grpSpPr>
+      <p:sp>
+        <p:nvSpPr>
+          <p:cNvPr id="4" name="Ellipse 3"/>
+          <p:cNvSpPr/>
+          <p:nvPr/>
+        </p:nvSpPr>
+        <p:spPr>
+          <a:xfrm>
+            <a:off x="4235450" y="3105150"/>
+            <a:ext cx="171450" cy="190500"/>
+          </a:xfrm>
+          <a:prstGeom prst="ellipse">
+            <a:avLst/>
+          </a:prstGeom>
+          <a:solidFill>
+            <a:schemeClr val="tx1"/>
+          </a:solidFill>
+        </p:spPr>
+        <p:style>
+          <a:lnRef idx="2">
+            <a:schemeClr val="accent1">
+              <a:shade val="50000"/>
+            </a:schemeClr>
+          </a:lnRef>
+          <a:fillRef idx="1">
+            <a:schemeClr val="accent1"/>
+          </a:fillRef>
+          <a:effectRef idx="0">
+            <a:schemeClr val="accent1"/>
+          </a:effectRef>
+          <a:fontRef idx="minor">
+            <a:schemeClr val="lt1"/>
+          </a:fontRef>
+        </p:style>
+        <p:txBody>
+          <a:bodyPr rot="0" spcFirstLastPara="0" vert="horz" wrap="square" lIns="91440" tIns="45720" rIns="91440" bIns="45720" numCol="1" spcCol="0" rtlCol="0" fromWordArt="0" anchor="ctr" anchorCtr="0" forceAA="0" compatLnSpc="1">
+            <a:prstTxWarp prst="textNoShape">
+              <a:avLst/>
+            </a:prstTxWarp>
+            <a:noAutofit/>
+          </a:bodyPr>
+          <a:lstStyle/>
+          <a:p>
+            <a:endParaRPr lang="en-GB"/>
+          </a:p>
+        </p:txBody>
+      </p:sp>
+      <p:sp>
+        <p:nvSpPr>
+          <p:cNvPr id="5" name="Ellipse 4"/>
+          <p:cNvSpPr/>
+          <p:nvPr/>
+        </p:nvSpPr>
+        <p:spPr>
+          <a:xfrm>
+            <a:off x="3987800" y="3314700"/>
+            <a:ext cx="171450" cy="190500"/>
+          </a:xfrm>
+          <a:prstGeom prst="ellipse">
+            <a:avLst/>
+          </a:prstGeom>
+          <a:solidFill>
+            <a:schemeClr val="tx1"/>
+          </a:solidFill>
+        </p:spPr>
+        <p:style>
+          <a:lnRef idx="2">
+            <a:schemeClr val="accent1">
+              <a:shade val="50000"/>
+            </a:schemeClr>
+          </a:lnRef>
+          <a:fillRef idx="1">
+            <a:schemeClr val="accent1"/>
+          </a:fillRef>
+          <a:effectRef idx="0">
+            <a:schemeClr val="accent1"/>
+          </a:effectRef>
+          <a:fontRef idx="minor">
+            <a:schemeClr val="lt1"/>
+          </a:fontRef>
+        </p:style>
+        <p:txBody>
+          <a:bodyPr rot="0" spcFirstLastPara="0" vert="horz" wrap="square" lIns="91440" tIns="45720" rIns="91440" bIns="45720" numCol="1" spcCol="0" rtlCol="0" fromWordArt="0" anchor="ctr" anchorCtr="0" forceAA="0" compatLnSpc="1">
+            <a:prstTxWarp prst="textNoShape">
+              <a:avLst/>
+            </a:prstTxWarp>
+            <a:noAutofit/>
+          </a:bodyPr>
+          <a:lstStyle/>
+          <a:p>
+            <a:endParaRPr lang="en-GB"/>
+          </a:p>
+        </p:txBody>
+      </p:sp>
+      <p:sp>
+        <p:nvSpPr>
+          <p:cNvPr id="6" name="Ellipse 5"/>
+          <p:cNvSpPr/>
+          <p:nvPr/>
+        </p:nvSpPr>
+        <p:spPr>
+          <a:xfrm>
+            <a:off x="4546600" y="3073400"/>
+            <a:ext cx="171450" cy="190500"/>
+          </a:xfrm>
+          <a:prstGeom prst="ellipse">
+            <a:avLst/>
+          </a:prstGeom>
+          <a:solidFill>
+            <a:schemeClr val="tx1"/>
+          </a:solidFill>
+        </p:spPr>
+        <p:style>
+          <a:lnRef idx="2">
+            <a:schemeClr val="accent1">
+              <a:shade val="50000"/>
+            </a:schemeClr>
+          </a:lnRef>
+          <a:fillRef idx="1">
+            <a:schemeClr val="accent1"/>
+          </a:fillRef>
+          <a:effectRef idx="0">
+            <a:schemeClr val="accent1"/>
+          </a:effectRef>
+          <a:fontRef idx="minor">
+            <a:schemeClr val="lt1"/>
+          </a:fontRef>
+        </p:style>
+        <p:txBody>
+          <a:bodyPr rot="0" spcFirstLastPara="0" vert="horz" wrap="square" lIns="91440" tIns="45720" rIns="91440" bIns="45720" numCol="1" spcCol="0" rtlCol="0" fromWordArt="0" anchor="ctr" anchorCtr="0" forceAA="0" compatLnSpc="1">
+            <a:prstTxWarp prst="textNoShape">
+              <a:avLst/>
+            </a:prstTxWarp>
+            <a:noAutofit/>
+          </a:bodyPr>
+          <a:lstStyle/>
+          <a:p>
+            <a:endParaRPr lang="en-GB"/>
+          </a:p>
+        </p:txBody>
+      </p:sp>
+      <p:sp>
+        <p:nvSpPr>
+          <p:cNvPr id="7" name="Ellipse 6"/>
+          <p:cNvSpPr/>
+          <p:nvPr/>
+        </p:nvSpPr>
+        <p:spPr>
+          <a:xfrm>
+            <a:off x="3810000" y="3568700"/>
+            <a:ext cx="171450" cy="190500"/>
+          </a:xfrm>
+          <a:prstGeom prst="ellipse">
+            <a:avLst/>
+          </a:prstGeom>
+          <a:solidFill>
+            <a:schemeClr val="tx1"/>
+          </a:solidFill>
+        </p:spPr>
+        <p:style>
+          <a:lnRef idx="2">
+            <a:schemeClr val="accent1">
+              <a:shade val="50000"/>
+            </a:schemeClr>
+          </a:lnRef>
+          <a:fillRef idx="1">
+            <a:schemeClr val="accent1"/>
+          </a:fillRef>
+          <a:effectRef idx="0">
+            <a:schemeClr val="accent1"/>
+          </a:effectRef>
+          <a:fontRef idx="minor">
+            <a:schemeClr val="lt1"/>
+          </a:fontRef>
+        </p:style>
+        <p:txBody>
+          <a:bodyPr rot="0" spcFirstLastPara="0" vert="horz" wrap="square" lIns="91440" tIns="45720" rIns="91440" bIns="45720" numCol="1" spcCol="0" rtlCol="0" fromWordArt="0" anchor="ctr" anchorCtr="0" forceAA="0" compatLnSpc="1">
+            <a:prstTxWarp prst="textNoShape">
+              <a:avLst/>
+            </a:prstTxWarp>
+            <a:noAutofit/>
+          </a:bodyPr>
+          <a:lstStyle/>
+          <a:p>
+            <a:endParaRPr lang="en-GB"/>
+          </a:p>
+        </p:txBody>
+      </p:sp>
+      <p:sp>
+        <p:nvSpPr>
+          <p:cNvPr id="8" name="Ellipse 7"/>
+          <p:cNvSpPr/>
+          <p:nvPr/>
+        </p:nvSpPr>
+        <p:spPr>
+          <a:xfrm>
+            <a:off x="5162550" y="3397250"/>
+            <a:ext cx="171450" cy="190500"/>
+          </a:xfrm>
+          <a:prstGeom prst="ellipse">
+            <a:avLst/>
+          </a:prstGeom>
+          <a:solidFill>
+            <a:schemeClr val="tx1"/>
+          </a:solidFill>
+        </p:spPr>
+        <p:style>
+          <a:lnRef idx="2">
+            <a:schemeClr val="accent1">
+              <a:shade val="50000"/>
+            </a:schemeClr>
+          </a:lnRef>
+          <a:fillRef idx="1">
+            <a:schemeClr val="accent1"/>
+          </a:fillRef>
+          <a:effectRef idx="0">
+            <a:schemeClr val="accent1"/>
+          </a:effectRef>
+          <a:fontRef idx="minor">
+            <a:schemeClr val="lt1"/>
+          </a:fontRef>
+        </p:style>
+        <p:txBody>
+          <a:bodyPr rot="0" spcFirstLastPara="0" vert="horz" wrap="square" lIns="91440" tIns="45720" rIns="91440" bIns="45720" numCol="1" spcCol="0" rtlCol="0" fromWordArt="0" anchor="ctr" anchorCtr="0" forceAA="0" compatLnSpc="1">
+            <a:prstTxWarp prst="textNoShape">
+              <a:avLst/>
+            </a:prstTxWarp>
+            <a:noAutofit/>
+          </a:bodyPr>
+          <a:lstStyle/>
+          <a:p>
+            <a:endParaRPr lang="en-GB"/>
+          </a:p>
+        </p:txBody>
+      </p:sp>
+      <p:sp>
+        <p:nvSpPr>
+          <p:cNvPr id="9" name="Ellipse 8"/>
+          <p:cNvSpPr/>
+          <p:nvPr/>
+        </p:nvSpPr>
+        <p:spPr>
+          <a:xfrm>
+            <a:off x="4883150" y="3175000"/>
+            <a:ext cx="171450" cy="190500"/>
+          </a:xfrm>
+          <a:prstGeom prst="ellipse">
+            <a:avLst/>
+          </a:prstGeom>
+          <a:solidFill>
+            <a:schemeClr val="tx1"/>
+          </a:solidFill>
+        </p:spPr>
+        <p:style>
+          <a:lnRef idx="2">
+            <a:schemeClr val="accent1">
+              <a:shade val="50000"/>
+            </a:schemeClr>
+          </a:lnRef>
+          <a:fillRef idx="1">
+            <a:schemeClr val="accent1"/>
+          </a:fillRef>
+          <a:effectRef idx="0">
+            <a:schemeClr val="accent1"/>
+          </a:effectRef>
+          <a:fontRef idx="minor">
+            <a:schemeClr val="lt1"/>
+          </a:fontRef>
+        </p:style>
+        <p:txBody>
+          <a:bodyPr rot="0" spcFirstLastPara="0" vert="horz" wrap="square" lIns="91440" tIns="45720" rIns="91440" bIns="45720" numCol="1" spcCol="0" rtlCol="0" fromWordArt="0" anchor="ctr" anchorCtr="0" forceAA="0" compatLnSpc="1">
+            <a:prstTxWarp prst="textNoShape">
+              <a:avLst/>
+            </a:prstTxWarp>
+            <a:noAutofit/>
+          </a:bodyPr>
+          <a:lstStyle/>
+          <a:p>
+            <a:endParaRPr lang="en-GB"/>
+          </a:p>
+        </p:txBody>
+      </p:sp>
+      <p:sp>
+        <p:nvSpPr>
+          <p:cNvPr id="10" name="Ellipse 9"/>
+          <p:cNvSpPr/>
+          <p:nvPr/>
+        </p:nvSpPr>
+        <p:spPr>
+          <a:xfrm>
+            <a:off x="4470400" y="3378200"/>
+            <a:ext cx="171450" cy="190500"/>
+          </a:xfrm>
+          <a:prstGeom prst="ellipse">
+            <a:avLst/>
+          </a:prstGeom>
+          <a:solidFill>
+            <a:srgbClr val="FF0000"/>
+          </a:solidFill>
+        </p:spPr>
+        <p:style>
+          <a:lnRef idx="2">
+            <a:schemeClr val="accent1">
+              <a:shade val="50000"/>
+            </a:schemeClr>
+          </a:lnRef>
+          <a:fillRef idx="1">
+            <a:schemeClr val="accent1"/>
+          </a:fillRef>
+          <a:effectRef idx="0">
+            <a:schemeClr val="accent1"/>
+          </a:effectRef>
+          <a:fontRef idx="minor">
+            <a:schemeClr val="lt1"/>
+          </a:fontRef>
+        </p:style>
+        <p:txBody>
+          <a:bodyPr rot="0" spcFirstLastPara="0" vert="horz" wrap="square" lIns="91440" tIns="45720" rIns="91440" bIns="45720" numCol="1" spcCol="0" rtlCol="0" fromWordArt="0" anchor="ctr" anchorCtr="0" forceAA="0" compatLnSpc="1">
+            <a:prstTxWarp prst="textNoShape">
+              <a:avLst/>
+            </a:prstTxWarp>
+            <a:noAutofit/>
+          </a:bodyPr>
+          <a:lstStyle/>
+          <a:p>
+            <a:endParaRPr lang="en-GB"/>
+          </a:p>
+        </p:txBody>
+      </p:sp>
+      <p:sp>
+        <p:nvSpPr>
+          <p:cNvPr id="11" name="Ellipse 10"/>
+          <p:cNvSpPr/>
+          <p:nvPr/>
+        </p:nvSpPr>
+        <p:spPr>
+          <a:xfrm>
+            <a:off x="5035550" y="3460750"/>
+            <a:ext cx="171450" cy="190500"/>
+          </a:xfrm>
+          <a:prstGeom prst="ellipse">
+            <a:avLst/>
+          </a:prstGeom>
+          <a:solidFill>
+            <a:srgbClr val="FF0000"/>
+          </a:solidFill>
+        </p:spPr>
+        <p:style>
+          <a:lnRef idx="2">
+            <a:schemeClr val="accent1">
+              <a:shade val="50000"/>
+            </a:schemeClr>
+          </a:lnRef>
+          <a:fillRef idx="1">
+            <a:schemeClr val="accent1"/>
+          </a:fillRef>
+          <a:effectRef idx="0">
+            <a:schemeClr val="accent1"/>
+          </a:effectRef>
+          <a:fontRef idx="minor">
+            <a:schemeClr val="lt1"/>
+          </a:fontRef>
+        </p:style>
+        <p:txBody>
+          <a:bodyPr rot="0" spcFirstLastPara="0" vert="horz" wrap="square" lIns="91440" tIns="45720" rIns="91440" bIns="45720" numCol="1" spcCol="0" rtlCol="0" fromWordArt="0" anchor="ctr" anchorCtr="0" forceAA="0" compatLnSpc="1">
+            <a:prstTxWarp prst="textNoShape">
+              <a:avLst/>
+            </a:prstTxWarp>
+            <a:noAutofit/>
+          </a:bodyPr>
+          <a:lstStyle/>
+          <a:p>
+            <a:endParaRPr lang="en-GB"/>
+          </a:p>
+        </p:txBody>
+      </p:sp>
+      <p:sp>
+        <p:nvSpPr>
+          <p:cNvPr id="12" name="Ellipse 11"/>
+          <p:cNvSpPr/>
+          <p:nvPr/>
+        </p:nvSpPr>
+        <p:spPr>
+          <a:xfrm>
+            <a:off x="3981450" y="3594100"/>
+            <a:ext cx="171450" cy="190500"/>
+          </a:xfrm>
+          <a:prstGeom prst="ellipse">
+            <a:avLst/>
+          </a:prstGeom>
+          <a:solidFill>
+            <a:srgbClr val="FF0000"/>
+          </a:solidFill>
+        </p:spPr>
+        <p:style>
+          <a:lnRef idx="2">
+            <a:schemeClr val="accent1">
+              <a:shade val="50000"/>
+            </a:schemeClr>
+          </a:lnRef>
+          <a:fillRef idx="1">
+            <a:schemeClr val="accent1"/>
+          </a:fillRef>
+          <a:effectRef idx="0">
+            <a:schemeClr val="accent1"/>
+          </a:effectRef>
+          <a:fontRef idx="minor">
+            <a:schemeClr val="lt1"/>
+          </a:fontRef>
+        </p:style>
+        <p:txBody>
+          <a:bodyPr rot="0" spcFirstLastPara="0" vert="horz" wrap="square" lIns="91440" tIns="45720" rIns="91440" bIns="45720" numCol="1" spcCol="0" rtlCol="0" fromWordArt="0" anchor="ctr" anchorCtr="0" forceAA="0" compatLnSpc="1">
+            <a:prstTxWarp prst="textNoShape">
+              <a:avLst/>
+            </a:prstTxWarp>
+            <a:noAutofit/>
+          </a:bodyPr>
+          <a:lstStyle/>
+          <a:p>
+            <a:endParaRPr lang="en-GB"/>
+          </a:p>
+        </p:txBody>
+      </p:sp>
+      <p:sp>
+        <p:nvSpPr>
+          <p:cNvPr id="13" name="Ellipse 12"/>
+          <p:cNvSpPr/>
+          <p:nvPr/>
+        </p:nvSpPr>
+        <p:spPr>
+          <a:xfrm>
+            <a:off x="4362450" y="3143250"/>
+            <a:ext cx="171450" cy="190500"/>
+          </a:xfrm>
+          <a:prstGeom prst="ellipse">
+            <a:avLst/>
+          </a:prstGeom>
+          <a:solidFill>
+            <a:srgbClr val="FF0000"/>
+          </a:solidFill>
+        </p:spPr>
+        <p:style>
+          <a:lnRef idx="2">
+            <a:schemeClr val="accent1">
+              <a:shade val="50000"/>
+            </a:schemeClr>
+          </a:lnRef>
+          <a:fillRef idx="1">
+            <a:schemeClr val="accent1"/>
+          </a:fillRef>
+          <a:effectRef idx="0">
+            <a:schemeClr val="accent1"/>
+          </a:effectRef>
+          <a:fontRef idx="minor">
+            <a:schemeClr val="lt1"/>
+          </a:fontRef>
+        </p:style>
+        <p:txBody>
+          <a:bodyPr rot="0" spcFirstLastPara="0" vert="horz" wrap="square" lIns="91440" tIns="45720" rIns="91440" bIns="45720" numCol="1" spcCol="0" rtlCol="0" fromWordArt="0" anchor="ctr" anchorCtr="0" forceAA="0" compatLnSpc="1">
+            <a:prstTxWarp prst="textNoShape">
+              <a:avLst/>
+            </a:prstTxWarp>
+            <a:noAutofit/>
+          </a:bodyPr>
+          <a:lstStyle/>
+          <a:p>
+            <a:endParaRPr lang="en-GB"/>
+          </a:p>
+        </p:txBody>
+      </p:sp>
+      <p:cxnSp>
+        <p:nvCxnSpPr>
+          <p:cNvPr id="14" name="Connecteur droit 13"/>
+          <p:cNvCxnSpPr/>
+          <p:nvPr/>
+        </p:nvCxnSpPr>
+        <p:spPr>
+          <a:xfrm flipV="1">
+            <a:off x="4133850" y="3505200"/>
+            <a:ext cx="374650" cy="184150"/>
+          </a:xfrm>
+          <a:prstGeom prst="line">
+            <a:avLst/>
+          </a:prstGeom>
+          <a:ln w="25400">
+            <a:solidFill>
+              <a:srgbClr val="FF0000"/>
+            </a:solidFill>
+          </a:ln>
+        </p:spPr>
+        <p:style>
+          <a:lnRef idx="1">
+            <a:schemeClr val="accent1"/>
+          </a:lnRef>
+          <a:fillRef idx="0">
+            <a:schemeClr val="accent1"/>
+          </a:fillRef>
+          <a:effectRef idx="0">
+            <a:schemeClr val="accent1"/>
+          </a:effectRef>
+          <a:fontRef idx="minor">
+            <a:schemeClr val="tx1"/>
+          </a:fontRef>
+        </p:style>
+      </p:cxnSp>
+      <p:cxnSp>
+        <p:nvCxnSpPr>
+          <p:cNvPr id="15" name="Connecteur droit 14"/>
+          <p:cNvCxnSpPr/>
+          <p:nvPr/>
+        </p:nvCxnSpPr>
+        <p:spPr>
+          <a:xfrm>
+            <a:off x="4464050" y="3321050"/>
+            <a:ext cx="76200" cy="120650"/>
+          </a:xfrm>
+          <a:prstGeom prst="line">
+            <a:avLst/>
+          </a:prstGeom>
+          <a:ln w="25400">
+            <a:solidFill>
+              <a:srgbClr val="FF0000"/>
+            </a:solidFill>
+          </a:ln>
+        </p:spPr>
+        <p:style>
+          <a:lnRef idx="1">
+            <a:schemeClr val="accent1"/>
+          </a:lnRef>
+          <a:fillRef idx="0">
+            <a:schemeClr val="accent1"/>
+          </a:fillRef>
+          <a:effectRef idx="0">
+            <a:schemeClr val="accent1"/>
+          </a:effectRef>
+          <a:fontRef idx="minor">
+            <a:schemeClr val="tx1"/>
+          </a:fontRef>
+        </p:style>
+      </p:cxnSp>
+      <p:cxnSp>
+        <p:nvCxnSpPr>
+          <p:cNvPr id="16" name="Connecteur droit 15"/>
+          <p:cNvCxnSpPr/>
+          <p:nvPr/>
+        </p:nvCxnSpPr>
+        <p:spPr>
+          <a:xfrm flipH="1" flipV="1">
+            <a:off x="4514850" y="3479800"/>
+            <a:ext cx="603250" cy="57150"/>
+          </a:xfrm>
+          <a:prstGeom prst="line">
+            <a:avLst/>
+          </a:prstGeom>
+          <a:ln w="25400">
+            <a:solidFill>
+              <a:srgbClr val="FF0000"/>
+            </a:solidFill>
+          </a:ln>
+        </p:spPr>
+        <p:style>
+          <a:lnRef idx="1">
+            <a:schemeClr val="accent1"/>
+          </a:lnRef>
+          <a:fillRef idx="0">
+            <a:schemeClr val="accent1"/>
+          </a:fillRef>
+          <a:effectRef idx="0">
+            <a:schemeClr val="accent1"/>
+          </a:effectRef>
+          <a:fontRef idx="minor">
+            <a:schemeClr val="tx1"/>
+          </a:fontRef>
+        </p:style>
+      </p:cxnSp>
+    </p:spTree>
+    <p:extLst>
+      <p:ext uri="{BB962C8B-B14F-4D97-AF65-F5344CB8AC3E}">
+        <p14:creationId xmlns:p14="http://schemas.microsoft.com/office/powerpoint/2010/main" val="3912221041"/>
+      </p:ext>
+    </p:extLst>
+  </p:cSld>
+  <p:clrMapOvr>
+    <a:masterClrMapping/>
+  </p:clrMapOvr>
+  <p:timing>
+    <p:tnLst>
+      <p:par>
+        <p:cTn id="1" dur="indefinite" restart="never" nodeType="tmRoot"/>
+      </p:par>
+    </p:tnLst>
+  </p:timing>
+</p:sld>
+</file>
+
+<file path=ppt/slides/slide24.xml><?xml version="1.0" encoding="utf-8"?>
+<p:sld xmlns:a="http://schemas.openxmlformats.org/drawingml/2006/main" xmlns:r="http://schemas.openxmlformats.org/officeDocument/2006/relationships" xmlns:p="http://schemas.openxmlformats.org/presentationml/2006/main">
+  <p:cSld>
+    <p:spTree>
+      <p:nvGrpSpPr>
+        <p:cNvPr id="1" name=""/>
+        <p:cNvGrpSpPr/>
+        <p:nvPr/>
+      </p:nvGrpSpPr>
+      <p:grpSpPr>
+        <a:xfrm>
+          <a:off x="0" y="0"/>
+          <a:ext cx="0" cy="0"/>
+          <a:chOff x="0" y="0"/>
+          <a:chExt cx="0" cy="0"/>
+        </a:xfrm>
+      </p:grpSpPr>
+      <p:pic>
+        <p:nvPicPr>
+          <p:cNvPr id="5" name="Image 4"/>
+          <p:cNvPicPr>
+            <a:picLocks noChangeAspect="1"/>
+          </p:cNvPicPr>
+          <p:nvPr/>
+        </p:nvPicPr>
+        <p:blipFill>
+          <a:blip r:embed="rId2"/>
+          <a:stretch>
+            <a:fillRect/>
+          </a:stretch>
+        </p:blipFill>
+        <p:spPr>
+          <a:xfrm>
+            <a:off x="76200" y="24581"/>
+            <a:ext cx="4432219" cy="3590200"/>
+          </a:xfrm>
+          <a:prstGeom prst="rect">
+            <a:avLst/>
+          </a:prstGeom>
+        </p:spPr>
+      </p:pic>
+      <p:pic>
+        <p:nvPicPr>
+          <p:cNvPr id="6" name="Image 5"/>
+          <p:cNvPicPr>
+            <a:picLocks noChangeAspect="1"/>
+          </p:cNvPicPr>
+          <p:nvPr/>
+        </p:nvPicPr>
+        <p:blipFill>
+          <a:blip r:embed="rId3"/>
+          <a:stretch>
+            <a:fillRect/>
+          </a:stretch>
+        </p:blipFill>
+        <p:spPr>
+          <a:xfrm>
+            <a:off x="2819400" y="24581"/>
+            <a:ext cx="4432219" cy="3590200"/>
+          </a:xfrm>
+          <a:prstGeom prst="rect">
+            <a:avLst/>
+          </a:prstGeom>
+        </p:spPr>
+      </p:pic>
+      <p:pic>
+        <p:nvPicPr>
+          <p:cNvPr id="7" name="Image 6"/>
+          <p:cNvPicPr>
+            <a:picLocks noChangeAspect="1"/>
+          </p:cNvPicPr>
+          <p:nvPr/>
+        </p:nvPicPr>
+        <p:blipFill>
+          <a:blip r:embed="rId4"/>
+          <a:stretch>
+            <a:fillRect/>
+          </a:stretch>
+        </p:blipFill>
+        <p:spPr>
+          <a:xfrm>
+            <a:off x="5562600" y="24581"/>
+            <a:ext cx="4432219" cy="3590200"/>
+          </a:xfrm>
+          <a:prstGeom prst="rect">
+            <a:avLst/>
+          </a:prstGeom>
+        </p:spPr>
+      </p:pic>
+      <p:pic>
+        <p:nvPicPr>
+          <p:cNvPr id="8" name="Image 7"/>
+          <p:cNvPicPr>
+            <a:picLocks noChangeAspect="1"/>
+          </p:cNvPicPr>
+          <p:nvPr/>
+        </p:nvPicPr>
+        <p:blipFill>
+          <a:blip r:embed="rId5"/>
+          <a:stretch>
+            <a:fillRect/>
+          </a:stretch>
+        </p:blipFill>
+        <p:spPr>
+          <a:xfrm>
+            <a:off x="95865" y="2438400"/>
+            <a:ext cx="4432219" cy="3590200"/>
+          </a:xfrm>
+          <a:prstGeom prst="rect">
+            <a:avLst/>
+          </a:prstGeom>
+        </p:spPr>
+      </p:pic>
+      <p:pic>
+        <p:nvPicPr>
+          <p:cNvPr id="9" name="Image 8"/>
+          <p:cNvPicPr>
+            <a:picLocks noChangeAspect="1"/>
+          </p:cNvPicPr>
+          <p:nvPr/>
+        </p:nvPicPr>
+        <p:blipFill>
+          <a:blip r:embed="rId6"/>
+          <a:stretch>
+            <a:fillRect/>
+          </a:stretch>
+        </p:blipFill>
+        <p:spPr>
+          <a:xfrm>
+            <a:off x="2863646" y="2438400"/>
+            <a:ext cx="4432219" cy="3590200"/>
+          </a:xfrm>
+          <a:prstGeom prst="rect">
+            <a:avLst/>
+          </a:prstGeom>
+        </p:spPr>
+      </p:pic>
+      <p:pic>
+        <p:nvPicPr>
+          <p:cNvPr id="10" name="Image 9"/>
+          <p:cNvPicPr>
+            <a:picLocks noChangeAspect="1"/>
+          </p:cNvPicPr>
+          <p:nvPr/>
+        </p:nvPicPr>
+        <p:blipFill>
+          <a:blip r:embed="rId7"/>
+          <a:stretch>
+            <a:fillRect/>
+          </a:stretch>
+        </p:blipFill>
+        <p:spPr>
+          <a:xfrm>
+            <a:off x="5582265" y="2438400"/>
+            <a:ext cx="4432219" cy="3590200"/>
+          </a:xfrm>
+          <a:prstGeom prst="rect">
+            <a:avLst/>
+          </a:prstGeom>
+        </p:spPr>
+      </p:pic>
+    </p:spTree>
+    <p:extLst>
+      <p:ext uri="{BB962C8B-B14F-4D97-AF65-F5344CB8AC3E}">
+        <p14:creationId xmlns:p14="http://schemas.microsoft.com/office/powerpoint/2010/main" val="2107424446"/>
+      </p:ext>
+    </p:extLst>
+  </p:cSld>
+  <p:clrMapOvr>
+    <a:masterClrMapping/>
+  </p:clrMapOvr>
+  <p:timing>
+    <p:tnLst>
+      <p:par>
+        <p:cTn id="1" dur="indefinite" restart="never" nodeType="tmRoot"/>
+      </p:par>
+    </p:tnLst>
+  </p:timing>
 </p:sld>
 </file>
 

</xml_diff>

<commit_message>
Adding Branch Center Bias Correction
</commit_message>
<xml_diff>
--- a/FiguresWiki/Examples.pptx
+++ b/FiguresWiki/Examples.pptx
@@ -29,6 +29,7 @@
     <p:sldId id="277" r:id="rId23"/>
     <p:sldId id="278" r:id="rId24"/>
     <p:sldId id="279" r:id="rId25"/>
+    <p:sldId id="280" r:id="rId26"/>
   </p:sldIdLst>
   <p:sldSz cx="9144000" cy="6858000" type="screen4x3"/>
   <p:notesSz cx="6858000" cy="9144000"/>
@@ -327,7 +328,7 @@
           <a:p>
             <a:fld id="{4AF8D1E4-79D5-419A-84F5-5184F8D0060F}" type="datetimeFigureOut">
               <a:rPr lang="en-US" smtClean="0"/>
-              <a:t>2/27/2018</a:t>
+              <a:t>2/28/2018</a:t>
             </a:fld>
             <a:endParaRPr lang="en-US" dirty="0"/>
           </a:p>
@@ -497,7 +498,7 @@
           <a:p>
             <a:fld id="{4AF8D1E4-79D5-419A-84F5-5184F8D0060F}" type="datetimeFigureOut">
               <a:rPr lang="en-US" smtClean="0"/>
-              <a:t>2/27/2018</a:t>
+              <a:t>2/28/2018</a:t>
             </a:fld>
             <a:endParaRPr lang="en-US" dirty="0"/>
           </a:p>
@@ -677,7 +678,7 @@
           <a:p>
             <a:fld id="{4AF8D1E4-79D5-419A-84F5-5184F8D0060F}" type="datetimeFigureOut">
               <a:rPr lang="en-US" smtClean="0"/>
-              <a:t>2/27/2018</a:t>
+              <a:t>2/28/2018</a:t>
             </a:fld>
             <a:endParaRPr lang="en-US" dirty="0"/>
           </a:p>
@@ -847,7 +848,7 @@
           <a:p>
             <a:fld id="{4AF8D1E4-79D5-419A-84F5-5184F8D0060F}" type="datetimeFigureOut">
               <a:rPr lang="en-US" smtClean="0"/>
-              <a:t>2/27/2018</a:t>
+              <a:t>2/28/2018</a:t>
             </a:fld>
             <a:endParaRPr lang="en-US" dirty="0"/>
           </a:p>
@@ -1093,7 +1094,7 @@
           <a:p>
             <a:fld id="{4AF8D1E4-79D5-419A-84F5-5184F8D0060F}" type="datetimeFigureOut">
               <a:rPr lang="en-US" smtClean="0"/>
-              <a:t>2/27/2018</a:t>
+              <a:t>2/28/2018</a:t>
             </a:fld>
             <a:endParaRPr lang="en-US" dirty="0"/>
           </a:p>
@@ -1381,7 +1382,7 @@
           <a:p>
             <a:fld id="{4AF8D1E4-79D5-419A-84F5-5184F8D0060F}" type="datetimeFigureOut">
               <a:rPr lang="en-US" smtClean="0"/>
-              <a:t>2/27/2018</a:t>
+              <a:t>2/28/2018</a:t>
             </a:fld>
             <a:endParaRPr lang="en-US" dirty="0"/>
           </a:p>
@@ -1803,7 +1804,7 @@
           <a:p>
             <a:fld id="{4AF8D1E4-79D5-419A-84F5-5184F8D0060F}" type="datetimeFigureOut">
               <a:rPr lang="en-US" smtClean="0"/>
-              <a:t>2/27/2018</a:t>
+              <a:t>2/28/2018</a:t>
             </a:fld>
             <a:endParaRPr lang="en-US" dirty="0"/>
           </a:p>
@@ -1921,7 +1922,7 @@
           <a:p>
             <a:fld id="{4AF8D1E4-79D5-419A-84F5-5184F8D0060F}" type="datetimeFigureOut">
               <a:rPr lang="en-US" smtClean="0"/>
-              <a:t>2/27/2018</a:t>
+              <a:t>2/28/2018</a:t>
             </a:fld>
             <a:endParaRPr lang="en-US" dirty="0"/>
           </a:p>
@@ -2016,7 +2017,7 @@
           <a:p>
             <a:fld id="{4AF8D1E4-79D5-419A-84F5-5184F8D0060F}" type="datetimeFigureOut">
               <a:rPr lang="en-US" smtClean="0"/>
-              <a:t>2/27/2018</a:t>
+              <a:t>2/28/2018</a:t>
             </a:fld>
             <a:endParaRPr lang="en-US" dirty="0"/>
           </a:p>
@@ -2293,7 +2294,7 @@
           <a:p>
             <a:fld id="{4AF8D1E4-79D5-419A-84F5-5184F8D0060F}" type="datetimeFigureOut">
               <a:rPr lang="en-US" smtClean="0"/>
-              <a:t>2/27/2018</a:t>
+              <a:t>2/28/2018</a:t>
             </a:fld>
             <a:endParaRPr lang="en-US" dirty="0"/>
           </a:p>
@@ -2546,7 +2547,7 @@
           <a:p>
             <a:fld id="{4AF8D1E4-79D5-419A-84F5-5184F8D0060F}" type="datetimeFigureOut">
               <a:rPr lang="en-US" smtClean="0"/>
-              <a:t>2/27/2018</a:t>
+              <a:t>2/28/2018</a:t>
             </a:fld>
             <a:endParaRPr lang="en-US" dirty="0"/>
           </a:p>
@@ -2759,7 +2760,7 @@
           <a:p>
             <a:fld id="{4AF8D1E4-79D5-419A-84F5-5184F8D0060F}" type="datetimeFigureOut">
               <a:rPr lang="en-US" smtClean="0"/>
-              <a:t>2/27/2018</a:t>
+              <a:t>2/28/2018</a:t>
             </a:fld>
             <a:endParaRPr lang="en-US" dirty="0"/>
           </a:p>
@@ -7151,6 +7152,204 @@
       </p:par>
     </p:tnLst>
   </p:timing>
+</p:sld>
+</file>
+
+<file path=ppt/slides/slide25.xml><?xml version="1.0" encoding="utf-8"?>
+<p:sld xmlns:a="http://schemas.openxmlformats.org/drawingml/2006/main" xmlns:r="http://schemas.openxmlformats.org/officeDocument/2006/relationships" xmlns:p="http://schemas.openxmlformats.org/presentationml/2006/main">
+  <p:cSld>
+    <p:spTree>
+      <p:nvGrpSpPr>
+        <p:cNvPr id="1" name=""/>
+        <p:cNvGrpSpPr/>
+        <p:nvPr/>
+      </p:nvGrpSpPr>
+      <p:grpSpPr>
+        <a:xfrm>
+          <a:off x="0" y="0"/>
+          <a:ext cx="0" cy="0"/>
+          <a:chOff x="0" y="0"/>
+          <a:chExt cx="0" cy="0"/>
+        </a:xfrm>
+      </p:grpSpPr>
+      <p:pic>
+        <p:nvPicPr>
+          <p:cNvPr id="4" name="Image 3"/>
+          <p:cNvPicPr>
+            <a:picLocks noChangeAspect="1"/>
+          </p:cNvPicPr>
+          <p:nvPr/>
+        </p:nvPicPr>
+        <p:blipFill>
+          <a:blip r:embed="rId2"/>
+          <a:stretch>
+            <a:fillRect/>
+          </a:stretch>
+        </p:blipFill>
+        <p:spPr>
+          <a:xfrm>
+            <a:off x="76200" y="-76200"/>
+            <a:ext cx="4432219" cy="3590200"/>
+          </a:xfrm>
+          <a:prstGeom prst="rect">
+            <a:avLst/>
+          </a:prstGeom>
+        </p:spPr>
+      </p:pic>
+      <p:pic>
+        <p:nvPicPr>
+          <p:cNvPr id="5" name="Image 4"/>
+          <p:cNvPicPr>
+            <a:picLocks noChangeAspect="1"/>
+          </p:cNvPicPr>
+          <p:nvPr/>
+        </p:nvPicPr>
+        <p:blipFill>
+          <a:blip r:embed="rId3"/>
+          <a:stretch>
+            <a:fillRect/>
+          </a:stretch>
+        </p:blipFill>
+        <p:spPr>
+          <a:xfrm>
+            <a:off x="2895600" y="-68826"/>
+            <a:ext cx="4432219" cy="3590200"/>
+          </a:xfrm>
+          <a:prstGeom prst="rect">
+            <a:avLst/>
+          </a:prstGeom>
+        </p:spPr>
+      </p:pic>
+      <p:pic>
+        <p:nvPicPr>
+          <p:cNvPr id="6" name="Image 5"/>
+          <p:cNvPicPr>
+            <a:picLocks noChangeAspect="1"/>
+          </p:cNvPicPr>
+          <p:nvPr/>
+        </p:nvPicPr>
+        <p:blipFill>
+          <a:blip r:embed="rId4"/>
+          <a:stretch>
+            <a:fillRect/>
+          </a:stretch>
+        </p:blipFill>
+        <p:spPr>
+          <a:xfrm>
+            <a:off x="5715000" y="-61452"/>
+            <a:ext cx="4432219" cy="3590200"/>
+          </a:xfrm>
+          <a:prstGeom prst="rect">
+            <a:avLst/>
+          </a:prstGeom>
+        </p:spPr>
+      </p:pic>
+      <p:pic>
+        <p:nvPicPr>
+          <p:cNvPr id="7" name="Image 6"/>
+          <p:cNvPicPr>
+            <a:picLocks noChangeAspect="1"/>
+          </p:cNvPicPr>
+          <p:nvPr/>
+        </p:nvPicPr>
+        <p:blipFill>
+          <a:blip r:embed="rId5"/>
+          <a:stretch>
+            <a:fillRect/>
+          </a:stretch>
+        </p:blipFill>
+        <p:spPr>
+          <a:xfrm>
+            <a:off x="76200" y="2438400"/>
+            <a:ext cx="4432219" cy="3590200"/>
+          </a:xfrm>
+          <a:prstGeom prst="rect">
+            <a:avLst/>
+          </a:prstGeom>
+        </p:spPr>
+      </p:pic>
+      <p:pic>
+        <p:nvPicPr>
+          <p:cNvPr id="8" name="Image 7"/>
+          <p:cNvPicPr>
+            <a:picLocks noChangeAspect="1"/>
+          </p:cNvPicPr>
+          <p:nvPr/>
+        </p:nvPicPr>
+        <p:blipFill>
+          <a:blip r:embed="rId6"/>
+          <a:stretch>
+            <a:fillRect/>
+          </a:stretch>
+        </p:blipFill>
+        <p:spPr>
+          <a:xfrm>
+            <a:off x="2895600" y="2438400"/>
+            <a:ext cx="4432219" cy="3590200"/>
+          </a:xfrm>
+          <a:prstGeom prst="rect">
+            <a:avLst/>
+          </a:prstGeom>
+        </p:spPr>
+      </p:pic>
+      <p:pic>
+        <p:nvPicPr>
+          <p:cNvPr id="9" name="Image 8"/>
+          <p:cNvPicPr>
+            <a:picLocks noChangeAspect="1"/>
+          </p:cNvPicPr>
+          <p:nvPr/>
+        </p:nvPicPr>
+        <p:blipFill>
+          <a:blip r:embed="rId7"/>
+          <a:stretch>
+            <a:fillRect/>
+          </a:stretch>
+        </p:blipFill>
+        <p:spPr>
+          <a:xfrm>
+            <a:off x="5715000" y="2438400"/>
+            <a:ext cx="4432219" cy="3590200"/>
+          </a:xfrm>
+          <a:prstGeom prst="rect">
+            <a:avLst/>
+          </a:prstGeom>
+        </p:spPr>
+      </p:pic>
+      <p:pic>
+        <p:nvPicPr>
+          <p:cNvPr id="11" name="Image 10"/>
+          <p:cNvPicPr>
+            <a:picLocks noChangeAspect="1"/>
+          </p:cNvPicPr>
+          <p:nvPr/>
+        </p:nvPicPr>
+        <p:blipFill>
+          <a:blip r:embed="rId8"/>
+          <a:stretch>
+            <a:fillRect/>
+          </a:stretch>
+        </p:blipFill>
+        <p:spPr>
+          <a:xfrm>
+            <a:off x="83574" y="4791800"/>
+            <a:ext cx="4432219" cy="3590200"/>
+          </a:xfrm>
+          <a:prstGeom prst="rect">
+            <a:avLst/>
+          </a:prstGeom>
+        </p:spPr>
+      </p:pic>
+    </p:spTree>
+    <p:extLst>
+      <p:ext uri="{BB962C8B-B14F-4D97-AF65-F5344CB8AC3E}">
+        <p14:creationId xmlns:p14="http://schemas.microsoft.com/office/powerpoint/2010/main" val="3086863695"/>
+      </p:ext>
+    </p:extLst>
+  </p:cSld>
+  <p:clrMapOvr>
+    <a:masterClrMapping/>
+  </p:clrMapOvr>
 </p:sld>
 </file>
 

</xml_diff>